<commit_message>
updated slides for week 3
</commit_message>
<xml_diff>
--- a/helpsessions/week3/week3_methods_testing.pptx
+++ b/helpsessions/week3/week3_methods_testing.pptx
@@ -5,17 +5,21 @@
     <p:sldMasterId id="2147483648" r:id="rId1"/>
   </p:sldMasterIdLst>
   <p:notesMasterIdLst>
-    <p:notesMasterId r:id="rId7"/>
+    <p:notesMasterId r:id="rId11"/>
   </p:notesMasterIdLst>
   <p:handoutMasterIdLst>
-    <p:handoutMasterId r:id="rId8"/>
+    <p:handoutMasterId r:id="rId12"/>
   </p:handoutMasterIdLst>
   <p:sldIdLst>
     <p:sldId id="256" r:id="rId2"/>
-    <p:sldId id="259" r:id="rId3"/>
-    <p:sldId id="258" r:id="rId4"/>
-    <p:sldId id="257" r:id="rId5"/>
-    <p:sldId id="260" r:id="rId6"/>
+    <p:sldId id="264" r:id="rId3"/>
+    <p:sldId id="259" r:id="rId4"/>
+    <p:sldId id="261" r:id="rId5"/>
+    <p:sldId id="263" r:id="rId6"/>
+    <p:sldId id="258" r:id="rId7"/>
+    <p:sldId id="257" r:id="rId8"/>
+    <p:sldId id="262" r:id="rId9"/>
+    <p:sldId id="260" r:id="rId10"/>
   </p:sldIdLst>
   <p:sldSz cx="13817600" cy="7772400"/>
   <p:notesSz cx="6858000" cy="9144000"/>
@@ -218,7 +222,7 @@
           <a:p>
             <a:fld id="{4D7E51A5-B478-1E40-8CBB-0DAA8831E99D}" type="datetimeFigureOut">
               <a:rPr lang="en-US" smtClean="0"/>
-              <a:t>9/6/20</a:t>
+              <a:t>2/1/21</a:t>
             </a:fld>
             <a:endParaRPr lang="en-US"/>
           </a:p>
@@ -299,6 +303,454 @@
   </p:cSld>
   <p:clrMap bg1="lt1" tx1="dk1" bg2="lt2" tx2="dk2" accent1="accent1" accent2="accent2" accent3="accent3" accent4="accent4" accent5="accent5" accent6="accent6" hlink="hlink" folHlink="folHlink"/>
 </p:handoutMaster>
+</file>
+
+<file path=ppt/ink/ink1.xml><?xml version="1.0" encoding="utf-8"?>
+<inkml:ink xmlns:inkml="http://www.w3.org/2003/InkML">
+  <inkml:definitions>
+    <inkml:context xml:id="ctx0">
+      <inkml:inkSource xml:id="inkSrc0">
+        <inkml:traceFormat>
+          <inkml:channel name="X" type="integer" min="-2.14748E9" max="2.14748E9" units="cm"/>
+          <inkml:channel name="Y" type="integer" min="-2.14748E9" max="2.14748E9" units="cm"/>
+        </inkml:traceFormat>
+        <inkml:channelProperties>
+          <inkml:channelProperty channel="X" name="resolution" value="1000" units="1/cm"/>
+          <inkml:channelProperty channel="Y" name="resolution" value="1000" units="1/cm"/>
+        </inkml:channelProperties>
+      </inkml:inkSource>
+      <inkml:timestamp xml:id="ts0" timeString="2021-01-29T17:33:33.366"/>
+    </inkml:context>
+    <inkml:brush xml:id="br0">
+      <inkml:brushProperty name="width" value="0.3" units="cm"/>
+      <inkml:brushProperty name="height" value="0.6" units="cm"/>
+      <inkml:brushProperty name="color" value="#FFFC00"/>
+      <inkml:brushProperty name="tip" value="rectangle"/>
+      <inkml:brushProperty name="rasterOp" value="maskPen"/>
+    </inkml:brush>
+  </inkml:definitions>
+  <inkml:trace contextRef="#ctx0" brushRef="#br0">0 21,'57'0,"-2"0,-12 0,1 0,0 0,-1 0,-7 0,6 0,-15 0,15 0,-15 0,26 0,-29 0,27 0,-30 0,21 0,-15 6,6 1,1 0,-7-1,7-6,-1 0,-6 0,7 0,-15 0,4 0,-11 0,5 0,-1 0,-5 4,9 2,-8 0,2 3,1-4,0 5,0-1,0-3,0-2,1-4,7-5,1-2,1-6,0 1,0 5,0-5,1 11,-8-9,6 9,-12-9,8 9,42-4,15 5,-16 4,3 2,-8 2,-2 3,42 17,-18 7,-11-9,-19-4,27 4,-24-9,28 9,-23-17,-1-1,-12-8,-7 0,-3-6,1-8,-7-6,7-2,-9-2,0 5,0-1,0 2,-6 11,4-4,-4 10,0-5,4 6,-4 0,6 0,-6-5,4 4,-4-3,0 4,4-6,-4 5,6-5,0 6,0 0,9 0,-7 0,7 0,-9 0,8 0,-6 0,7 0,-16 0,6 0,-5 0,-1-5,0-7,-7 0,5-5,-4 11,3 1,5 5,-7 0,7 0,-5 0,-4 0,9 0,-5 0,0 0,2 0,-3 0,5 0,-3 0,3 0,-7 0,8 0,-4 0,0 0,2 0,-3 0,-1 0,4 0,-3 0,3 0</inkml:trace>
+</inkml:ink>
+</file>
+
+<file path=ppt/ink/ink10.xml><?xml version="1.0" encoding="utf-8"?>
+<inkml:ink xmlns:inkml="http://www.w3.org/2003/InkML">
+  <inkml:definitions>
+    <inkml:context xml:id="ctx0">
+      <inkml:inkSource xml:id="inkSrc0">
+        <inkml:traceFormat>
+          <inkml:channel name="X" type="integer" min="-2.14748E9" max="2.14748E9" units="cm"/>
+          <inkml:channel name="Y" type="integer" min="-2.14748E9" max="2.14748E9" units="cm"/>
+        </inkml:traceFormat>
+        <inkml:channelProperties>
+          <inkml:channelProperty channel="X" name="resolution" value="1000" units="1/cm"/>
+          <inkml:channelProperty channel="Y" name="resolution" value="1000" units="1/cm"/>
+        </inkml:channelProperties>
+      </inkml:inkSource>
+      <inkml:timestamp xml:id="ts0" timeString="2021-01-29T17:36:22.313"/>
+    </inkml:context>
+    <inkml:brush xml:id="br0">
+      <inkml:brushProperty name="width" value="0.3" units="cm"/>
+      <inkml:brushProperty name="height" value="0.6" units="cm"/>
+      <inkml:brushProperty name="color" value="#00F900"/>
+      <inkml:brushProperty name="tip" value="rectangle"/>
+      <inkml:brushProperty name="rasterOp" value="maskPen"/>
+    </inkml:brush>
+  </inkml:definitions>
+  <inkml:trace contextRef="#ctx0" brushRef="#br0">0 0,'66'0,"-13"0,-12 0,-13 0,5 0,1 0,-14 0,6 0,-16 0,5 0,1 0,0 0,4 0,-8 0,9 4,-9 2,3-1,2 0,-5-5,10 5,-11 1,4 4,-4 1,4-1,-3 1,3-1,-4 1,4-5,1-2,1-4,2 0,-7 0,8 5,-4-4,1 8,-2-7,0 2,1 1,0-4,-1 8,0-8,1 3,0-4,2 0,-3 0,0 0,3 0,-4 0,1 0,3 0,-3 0,0 0,3 0,-4 0</inkml:trace>
+</inkml:ink>
+</file>
+
+<file path=ppt/ink/ink11.xml><?xml version="1.0" encoding="utf-8"?>
+<inkml:ink xmlns:inkml="http://www.w3.org/2003/InkML">
+  <inkml:definitions>
+    <inkml:context xml:id="ctx0">
+      <inkml:inkSource xml:id="inkSrc0">
+        <inkml:traceFormat>
+          <inkml:channel name="X" type="integer" min="-2.14748E9" max="2.14748E9" units="cm"/>
+          <inkml:channel name="Y" type="integer" min="-2.14748E9" max="2.14748E9" units="cm"/>
+        </inkml:traceFormat>
+        <inkml:channelProperties>
+          <inkml:channelProperty channel="X" name="resolution" value="1000" units="1/cm"/>
+          <inkml:channelProperty channel="Y" name="resolution" value="1000" units="1/cm"/>
+        </inkml:channelProperties>
+      </inkml:inkSource>
+      <inkml:timestamp xml:id="ts0" timeString="2021-01-29T17:36:24.759"/>
+    </inkml:context>
+    <inkml:brush xml:id="br0">
+      <inkml:brushProperty name="width" value="0.3" units="cm"/>
+      <inkml:brushProperty name="height" value="0.6" units="cm"/>
+      <inkml:brushProperty name="color" value="#00F900"/>
+      <inkml:brushProperty name="tip" value="rectangle"/>
+      <inkml:brushProperty name="rasterOp" value="maskPen"/>
+    </inkml:brush>
+  </inkml:definitions>
+  <inkml:trace contextRef="#ctx0" brushRef="#br0">0 1,'68'0,"-14"0,-12 0,-15 0,14 0,-13 0,5 0,10 0,-13 0,22 0,-25 0,15 0,-6 0,7 0,-14 0,11 0,-19 0,13 0,-16 0,6 0,-12 0,5 0,-2 5,4 1,-3 5,1 0,-6 0,6 0,-5 0,5 1,-6-2,4-4,1-1,0-5,3 4,-8-3,7 3,-3-4</inkml:trace>
+</inkml:ink>
+</file>
+
+<file path=ppt/ink/ink12.xml><?xml version="1.0" encoding="utf-8"?>
+<inkml:ink xmlns:inkml="http://www.w3.org/2003/InkML">
+  <inkml:definitions>
+    <inkml:context xml:id="ctx0">
+      <inkml:inkSource xml:id="inkSrc0">
+        <inkml:traceFormat>
+          <inkml:channel name="X" type="integer" min="-2.14748E9" max="2.14748E9" units="cm"/>
+          <inkml:channel name="Y" type="integer" min="-2.14748E9" max="2.14748E9" units="cm"/>
+        </inkml:traceFormat>
+        <inkml:channelProperties>
+          <inkml:channelProperty channel="X" name="resolution" value="1000" units="1/cm"/>
+          <inkml:channelProperty channel="Y" name="resolution" value="1000" units="1/cm"/>
+        </inkml:channelProperties>
+      </inkml:inkSource>
+      <inkml:timestamp xml:id="ts0" timeString="2021-01-29T17:36:27.890"/>
+    </inkml:context>
+    <inkml:brush xml:id="br0">
+      <inkml:brushProperty name="width" value="0.3" units="cm"/>
+      <inkml:brushProperty name="height" value="0.6" units="cm"/>
+      <inkml:brushProperty name="color" value="#00F900"/>
+      <inkml:brushProperty name="tip" value="rectangle"/>
+      <inkml:brushProperty name="rasterOp" value="maskPen"/>
+    </inkml:brush>
+  </inkml:definitions>
+  <inkml:trace contextRef="#ctx0" brushRef="#br0">1 1,'45'0,"0"0,-26 0,14 0,-12 0,19 0,-11 0,0 0,3 0,-5 0,1 0,5 0,-8 0,0 0,1 0,-1 0,-7 0,6 0,-6 0,1 0,5 0,-12 5,11 1,-4 6,0-5,-2 3,0-9,-5 9,10-4,-11-1,4 4,4-3,-7 0,7 3,-4-8,-3 8,8-3,-2 0,-1 4,0-9,0 3,-5-4,16 0,-15 0,15 6,-16-5,5 10,-1-5,-5 4,9-4,-8 3,6-8,-3 9,-1-9,0 4</inkml:trace>
+</inkml:ink>
+</file>
+
+<file path=ppt/ink/ink13.xml><?xml version="1.0" encoding="utf-8"?>
+<inkml:ink xmlns:inkml="http://www.w3.org/2003/InkML">
+  <inkml:definitions>
+    <inkml:context xml:id="ctx0">
+      <inkml:inkSource xml:id="inkSrc0">
+        <inkml:traceFormat>
+          <inkml:channel name="X" type="integer" min="-2.14748E9" max="2.14748E9" units="cm"/>
+          <inkml:channel name="Y" type="integer" min="-2.14748E9" max="2.14748E9" units="cm"/>
+        </inkml:traceFormat>
+        <inkml:channelProperties>
+          <inkml:channelProperty channel="X" name="resolution" value="1000" units="1/cm"/>
+          <inkml:channelProperty channel="Y" name="resolution" value="1000" units="1/cm"/>
+        </inkml:channelProperties>
+      </inkml:inkSource>
+      <inkml:timestamp xml:id="ts0" timeString="2021-01-29T17:37:15.720"/>
+    </inkml:context>
+    <inkml:brush xml:id="br0">
+      <inkml:brushProperty name="width" value="0.3" units="cm"/>
+      <inkml:brushProperty name="height" value="0.6" units="cm"/>
+      <inkml:brushProperty name="color" value="#D9AEFF"/>
+      <inkml:brushProperty name="tip" value="rectangle"/>
+      <inkml:brushProperty name="rasterOp" value="maskPen"/>
+    </inkml:brush>
+  </inkml:definitions>
+  <inkml:trace contextRef="#ctx0" brushRef="#br0">1 1,'52'0,"-12"0,-23 0,8 0,-10 0,10 0,-8 0,9 0,-5 0,11 5,-14 2,1 0,5-1,-6 0,7 1,-6 4,5 2,-6-2,1 1,4 0,-11-6,5 5,0-10,-4 3,8-4,-9 0,7 0,-3 0,-1 0,3 0,-3 0,0 0,3 0,-4 0,1 0,2 0,-1 0,-1 0,3 0,-1 0,-2 0,5 0,-8 0,7-4,-3-2</inkml:trace>
+</inkml:ink>
+</file>
+
+<file path=ppt/ink/ink14.xml><?xml version="1.0" encoding="utf-8"?>
+<inkml:ink xmlns:inkml="http://www.w3.org/2003/InkML">
+  <inkml:definitions>
+    <inkml:context xml:id="ctx0">
+      <inkml:inkSource xml:id="inkSrc0">
+        <inkml:traceFormat>
+          <inkml:channel name="X" type="integer" min="-2.14748E9" max="2.14748E9" units="cm"/>
+          <inkml:channel name="Y" type="integer" min="-2.14748E9" max="2.14748E9" units="cm"/>
+        </inkml:traceFormat>
+        <inkml:channelProperties>
+          <inkml:channelProperty channel="X" name="resolution" value="1000" units="1/cm"/>
+          <inkml:channelProperty channel="Y" name="resolution" value="1000" units="1/cm"/>
+        </inkml:channelProperties>
+      </inkml:inkSource>
+      <inkml:timestamp xml:id="ts0" timeString="2021-01-29T17:37:18.660"/>
+    </inkml:context>
+    <inkml:brush xml:id="br0">
+      <inkml:brushProperty name="width" value="0.3" units="cm"/>
+      <inkml:brushProperty name="height" value="0.6" units="cm"/>
+      <inkml:brushProperty name="color" value="#D9AEFF"/>
+      <inkml:brushProperty name="tip" value="rectangle"/>
+      <inkml:brushProperty name="rasterOp" value="maskPen"/>
+    </inkml:brush>
+  </inkml:definitions>
+  <inkml:trace contextRef="#ctx0" brushRef="#br0">0 1,'45'0,"-1"0,-32 0,12 0,-13 0,5 0,2 0,-6 0,18 0,-17 0,16 0,-17 0,11 0,-4 0,-1 0,-1 5,-2 0,-3 6,7-5,-7-2,3 1,0-4,8 10,-5-10,11 10,-17-5,11 1,-11 2,6-7,-3 7,-4-8,9 4,-3-1,-1-2,4 2,-9-4,8 0,-4 0,0 0,4 0,-8 0,8 0,-4 0,0 0,-2 0</inkml:trace>
+</inkml:ink>
+</file>
+
+<file path=ppt/ink/ink15.xml><?xml version="1.0" encoding="utf-8"?>
+<inkml:ink xmlns:inkml="http://www.w3.org/2003/InkML">
+  <inkml:definitions>
+    <inkml:context xml:id="ctx0">
+      <inkml:inkSource xml:id="inkSrc0">
+        <inkml:traceFormat>
+          <inkml:channel name="X" type="integer" min="-2.14748E9" max="2.14748E9" units="cm"/>
+          <inkml:channel name="Y" type="integer" min="-2.14748E9" max="2.14748E9" units="cm"/>
+        </inkml:traceFormat>
+        <inkml:channelProperties>
+          <inkml:channelProperty channel="X" name="resolution" value="1000" units="1/cm"/>
+          <inkml:channelProperty channel="Y" name="resolution" value="1000" units="1/cm"/>
+        </inkml:channelProperties>
+      </inkml:inkSource>
+      <inkml:timestamp xml:id="ts0" timeString="2021-01-29T17:37:20.946"/>
+    </inkml:context>
+    <inkml:brush xml:id="br0">
+      <inkml:brushProperty name="width" value="0.3" units="cm"/>
+      <inkml:brushProperty name="height" value="0.6" units="cm"/>
+      <inkml:brushProperty name="color" value="#D9AEFF"/>
+      <inkml:brushProperty name="tip" value="rectangle"/>
+      <inkml:brushProperty name="rasterOp" value="maskPen"/>
+    </inkml:brush>
+  </inkml:definitions>
+  <inkml:trace contextRef="#ctx0" brushRef="#br0">1 1,'62'0,"-3"0,-5 0,-7 6,7-4,-10 17,-8-15,5 9,-5-13,-1 0,-1 0,-9 0,-6 0,-2 0,-2 0,1 0,-1 0,3 0,-4 0</inkml:trace>
+</inkml:ink>
+</file>
+
+<file path=ppt/ink/ink16.xml><?xml version="1.0" encoding="utf-8"?>
+<inkml:ink xmlns:inkml="http://www.w3.org/2003/InkML">
+  <inkml:definitions>
+    <inkml:context xml:id="ctx0">
+      <inkml:inkSource xml:id="inkSrc0">
+        <inkml:traceFormat>
+          <inkml:channel name="X" type="integer" min="-2.14748E9" max="2.14748E9" units="cm"/>
+          <inkml:channel name="Y" type="integer" min="-2.14748E9" max="2.14748E9" units="cm"/>
+        </inkml:traceFormat>
+        <inkml:channelProperties>
+          <inkml:channelProperty channel="X" name="resolution" value="1000" units="1/cm"/>
+          <inkml:channelProperty channel="Y" name="resolution" value="1000" units="1/cm"/>
+        </inkml:channelProperties>
+      </inkml:inkSource>
+      <inkml:timestamp xml:id="ts0" timeString="2021-01-29T17:37:24.446"/>
+    </inkml:context>
+    <inkml:brush xml:id="br0">
+      <inkml:brushProperty name="width" value="0.3" units="cm"/>
+      <inkml:brushProperty name="height" value="0.6" units="cm"/>
+      <inkml:brushProperty name="color" value="#D9AEFF"/>
+      <inkml:brushProperty name="tip" value="rectangle"/>
+      <inkml:brushProperty name="rasterOp" value="maskPen"/>
+    </inkml:brush>
+  </inkml:definitions>
+  <inkml:trace contextRef="#ctx0" brushRef="#br0">0 1,'85'0,"-8"0,-33 0,-1 0,11 0,-8 0,4 0,-15 0,-5 0,-12 0,-1 0,-3 0,2 0,2 0,-3 0,2 0,-2 0,0 0,4 0,-8 0,9 0,-3 4,-1-2,4 2,-9-4,8 0,-4 0,1 0,2 5,-3 0</inkml:trace>
+</inkml:ink>
+</file>
+
+<file path=ppt/ink/ink2.xml><?xml version="1.0" encoding="utf-8"?>
+<inkml:ink xmlns:inkml="http://www.w3.org/2003/InkML">
+  <inkml:definitions>
+    <inkml:context xml:id="ctx0">
+      <inkml:inkSource xml:id="inkSrc0">
+        <inkml:traceFormat>
+          <inkml:channel name="X" type="integer" min="-2.14748E9" max="2.14748E9" units="cm"/>
+          <inkml:channel name="Y" type="integer" min="-2.14748E9" max="2.14748E9" units="cm"/>
+        </inkml:traceFormat>
+        <inkml:channelProperties>
+          <inkml:channelProperty channel="X" name="resolution" value="1000" units="1/cm"/>
+          <inkml:channelProperty channel="Y" name="resolution" value="1000" units="1/cm"/>
+        </inkml:channelProperties>
+      </inkml:inkSource>
+      <inkml:timestamp xml:id="ts0" timeString="2021-01-29T17:33:39.565"/>
+    </inkml:context>
+    <inkml:brush xml:id="br0">
+      <inkml:brushProperty name="width" value="0.3" units="cm"/>
+      <inkml:brushProperty name="height" value="0.6" units="cm"/>
+      <inkml:brushProperty name="color" value="#FFFC00"/>
+      <inkml:brushProperty name="tip" value="rectangle"/>
+      <inkml:brushProperty name="rasterOp" value="maskPen"/>
+    </inkml:brush>
+  </inkml:definitions>
+  <inkml:trace contextRef="#ctx0" brushRef="#br0">0 130,'46'0,"27"0,-10 0,30 0,-21 0,16 0,-2 0,11 0,-1 0,-7 0,-20 0,9 0,0 0,-18 0,6 0,-13 0,-7 0,18 0,-18-6,8-9,-18 6,16-12,-14 19,8-16,-5 15,-13-14,-1 6,-10 3,-11-6,18 13,-14-4,15 5,-10 5,-3 1,7-1,-3 0,1-5,2 4,-8-3,9 4,-5-5,1 0,3 5,-7-4,3 8,1-3,2 0,-2 3,1-7,-2 2,2 1,-1-4,3 4,-7-5,6 0,-3 0,0 0,3 8,-7-6,8 6,-1-8,6 0,9 0,-6 0,25 0,-14 0,27 0,-19 0,18 0,-8 0,0 0,8 0,-26 6,14-5,-25 4,6-5,-14 0,1 0,29 0,24 0,12 0,8 0,-37 0,-2 0,-19 6,17 3,-13 5,15 1,-19-1,-8-1,-10-2,-6-5,4 3,-3-3,3 5,-1-5,-3 3,8-8,-4 4,3-5</inkml:trace>
+</inkml:ink>
+</file>
+
+<file path=ppt/ink/ink3.xml><?xml version="1.0" encoding="utf-8"?>
+<inkml:ink xmlns:inkml="http://www.w3.org/2003/InkML">
+  <inkml:definitions>
+    <inkml:context xml:id="ctx0">
+      <inkml:inkSource xml:id="inkSrc0">
+        <inkml:traceFormat>
+          <inkml:channel name="X" type="integer" min="-2.14748E9" max="2.14748E9" units="cm"/>
+          <inkml:channel name="Y" type="integer" min="-2.14748E9" max="2.14748E9" units="cm"/>
+        </inkml:traceFormat>
+        <inkml:channelProperties>
+          <inkml:channelProperty channel="X" name="resolution" value="1000" units="1/cm"/>
+          <inkml:channelProperty channel="Y" name="resolution" value="1000" units="1/cm"/>
+        </inkml:channelProperties>
+      </inkml:inkSource>
+      <inkml:timestamp xml:id="ts0" timeString="2021-01-29T17:33:42.659"/>
+    </inkml:context>
+    <inkml:brush xml:id="br0">
+      <inkml:brushProperty name="width" value="0.3" units="cm"/>
+      <inkml:brushProperty name="height" value="0.6" units="cm"/>
+      <inkml:brushProperty name="color" value="#FFFC00"/>
+      <inkml:brushProperty name="tip" value="rectangle"/>
+      <inkml:brushProperty name="rasterOp" value="maskPen"/>
+    </inkml:brush>
+  </inkml:definitions>
+  <inkml:trace contextRef="#ctx0" brushRef="#br0">0 63,'99'0,"-44"0,1 0,-2 0,4 0,28 0,4 0,-14 0,2 0,-8 0,4 0,-4 0,13 0,-1 0,15 0,0 0,-15 0,0 0,6 0,0 0,3 0,-5 0,-24 0,-1 0,16 0,-3 0,25 0,-37 0,0 0,-6 0,-1 0,-1 0,-3 0,31 0,-4 0,-11 0,-11 0,-2 0,-10-6,0 4,-8-10,-3 5,-8 0,0-4,-6 5,5-1,-12 2,11 5,-11 0,5 0,1 0,-6 0,11 0,-4 0,6 0,0 0,9 0,1 0,19 0,-7 0,17 0,-8 0,0 0,-3 0,-9 7,0 1,0 0,-9 4,-1-10,-9 3,-6-5,-2 0,-2 0,-3 5,-2 13,-36-9,7 8,-26-17,20 0,-8 0,5-6,-5-1,0 0,12 1,-11 1,13 3,1-3,1 0,2 4,-1-4,-3 5,5 0,-9 0,11 0,-8 0,10 0</inkml:trace>
+</inkml:ink>
+</file>
+
+<file path=ppt/ink/ink4.xml><?xml version="1.0" encoding="utf-8"?>
+<inkml:ink xmlns:inkml="http://www.w3.org/2003/InkML">
+  <inkml:definitions>
+    <inkml:context xml:id="ctx0">
+      <inkml:inkSource xml:id="inkSrc0">
+        <inkml:traceFormat>
+          <inkml:channel name="X" type="integer" min="-2.14748E9" max="2.14748E9" units="cm"/>
+          <inkml:channel name="Y" type="integer" min="-2.14748E9" max="2.14748E9" units="cm"/>
+        </inkml:traceFormat>
+        <inkml:channelProperties>
+          <inkml:channelProperty channel="X" name="resolution" value="1000" units="1/cm"/>
+          <inkml:channelProperty channel="Y" name="resolution" value="1000" units="1/cm"/>
+        </inkml:channelProperties>
+      </inkml:inkSource>
+      <inkml:timestamp xml:id="ts0" timeString="2021-01-29T17:33:46.219"/>
+    </inkml:context>
+    <inkml:brush xml:id="br0">
+      <inkml:brushProperty name="width" value="0.3" units="cm"/>
+      <inkml:brushProperty name="height" value="0.6" units="cm"/>
+      <inkml:brushProperty name="color" value="#FFFC00"/>
+      <inkml:brushProperty name="tip" value="rectangle"/>
+      <inkml:brushProperty name="rasterOp" value="maskPen"/>
+    </inkml:brush>
+  </inkml:definitions>
+  <inkml:trace contextRef="#ctx0" brushRef="#br0">0 28,'77'0,"9"0,-31 0,2 0,6 0,4 0,20 1,4-2,-25-3,1 0,1 0,5 2,2 2,1-1,4-3,0-1,2 2,6 6,0 2,1 0,1-4,0 0,0 0,-5 3,-1 1,-4-1,13-3,-5-2,-2 1,-5 0,-29 0,-1 0,6 0,0 0,36 0,-51 0,6 0,-10 0,5 0,21 0,-18 0,8 0,-18 0,16 0,-22 0,22 7,-25 0,0 1,-10-3,-6-5,7 4,-5-3,5 3,-3-4,1 0,-1 0,4 0,-4 0,1 0,1 0,-2 0,0 0,5 0,-9 0,9 0,-6 0,2 0,1 4,-7 6,4 6</inkml:trace>
+</inkml:ink>
+</file>
+
+<file path=ppt/ink/ink5.xml><?xml version="1.0" encoding="utf-8"?>
+<inkml:ink xmlns:inkml="http://www.w3.org/2003/InkML">
+  <inkml:definitions>
+    <inkml:context xml:id="ctx0">
+      <inkml:inkSource xml:id="inkSrc0">
+        <inkml:traceFormat>
+          <inkml:channel name="X" type="integer" min="-2.14748E9" max="2.14748E9" units="cm"/>
+          <inkml:channel name="Y" type="integer" min="-2.14748E9" max="2.14748E9" units="cm"/>
+        </inkml:traceFormat>
+        <inkml:channelProperties>
+          <inkml:channelProperty channel="X" name="resolution" value="1000" units="1/cm"/>
+          <inkml:channelProperty channel="Y" name="resolution" value="1000" units="1/cm"/>
+        </inkml:channelProperties>
+      </inkml:inkSource>
+      <inkml:timestamp xml:id="ts0" timeString="2021-01-29T17:33:49.640"/>
+    </inkml:context>
+    <inkml:brush xml:id="br0">
+      <inkml:brushProperty name="width" value="0.3" units="cm"/>
+      <inkml:brushProperty name="height" value="0.6" units="cm"/>
+      <inkml:brushProperty name="color" value="#FFFC00"/>
+      <inkml:brushProperty name="tip" value="rectangle"/>
+      <inkml:brushProperty name="rasterOp" value="maskPen"/>
+    </inkml:brush>
+  </inkml:definitions>
+  <inkml:trace contextRef="#ctx0" brushRef="#br0">1 71,'89'0,"-36"0,-4 0,0 0,40 0,-18 0,23 0,-12 0,9 0,-21 0,8 0,1 0,1 0,2 0,7 0,-7 0,-1 0,10 0,-32 0,17 0,-19 0,-1 0,-2-6,-10 4,0-5,0 7,0-6,0 4,0-4,10 6,-8 0,8 0,-10-7,10 6,-7-6,17 0,-17 5,7-6,0 8,2 0,1 0,7 0,-7 0,0 0,-3 0,-11 0,1 0,0 0,-9 0,-2 0,-8 0,-6 0,5 0,-12 0,5 5,-2-4,-3 4,7-5,-4 0,0 0,2 0,-1 0,-1 0,5-4,-9 3,9-8,-9 8,9-4,-4 5,-1 0,4 0,-8 0,8 0,-3 0,-1 0,3 0,-4 0</inkml:trace>
+</inkml:ink>
+</file>
+
+<file path=ppt/ink/ink6.xml><?xml version="1.0" encoding="utf-8"?>
+<inkml:ink xmlns:inkml="http://www.w3.org/2003/InkML">
+  <inkml:definitions>
+    <inkml:context xml:id="ctx0">
+      <inkml:inkSource xml:id="inkSrc0">
+        <inkml:traceFormat>
+          <inkml:channel name="X" type="integer" min="-2.14748E9" max="2.14748E9" units="cm"/>
+          <inkml:channel name="Y" type="integer" min="-2.14748E9" max="2.14748E9" units="cm"/>
+        </inkml:traceFormat>
+        <inkml:channelProperties>
+          <inkml:channelProperty channel="X" name="resolution" value="1000" units="1/cm"/>
+          <inkml:channelProperty channel="Y" name="resolution" value="1000" units="1/cm"/>
+        </inkml:channelProperties>
+      </inkml:inkSource>
+      <inkml:timestamp xml:id="ts0" timeString="2021-01-29T17:33:53.222"/>
+    </inkml:context>
+    <inkml:brush xml:id="br0">
+      <inkml:brushProperty name="width" value="0.3" units="cm"/>
+      <inkml:brushProperty name="height" value="0.6" units="cm"/>
+      <inkml:brushProperty name="color" value="#FFFC00"/>
+      <inkml:brushProperty name="tip" value="rectangle"/>
+      <inkml:brushProperty name="rasterOp" value="maskPen"/>
+    </inkml:brush>
+  </inkml:definitions>
+  <inkml:trace contextRef="#ctx0" brushRef="#br0">1 25,'45'0,"4"0,-3 0,0 0,18 0,-7 0,10 0,0 0,-15 0,2 0,22 0,-22 0,-2 0,15 0,12 0,-10 0,22 0,8 0,-23 0,-23 0,-1 0,16 0,32 0,-31 0,-5 0,-22 0,-7 0,1 0,6 0,-15 0,7 0,-9 0,-7 0,6 0,-12 0,5 0,-2 0,2 0,-1 0,4 0,-8 0,8 0,2 0,3 0,-2 0,1 0,-12 0,11 0,-10 0,10 0,-11 0,5 0,-1 0,0 0,0 0,4 0,-9 0,9 0,-2 0,5 0,3 0,7 0,-6 0,15 0,-6 0,-1 0,7 0,-6 0,8 0,-9 0,7 0,-6-6,-1 4,7-4,-15 6,7 0,-9 0,0 0,0 0,0 0,-6-5,4 4,-10-4,4 5,-2 0,1 0,1 0,3 0,-9 0,9 0,-3 0,-1 0,4 0,-8 0,8 0,-5 0,1 5,3 4,-13 2,7 3,1-8,-2-2,15 1,-14-4,6 8,-3-8,-5 4,11 1,-10-5,5 4,-3-1,2 1</inkml:trace>
+</inkml:ink>
+</file>
+
+<file path=ppt/ink/ink7.xml><?xml version="1.0" encoding="utf-8"?>
+<inkml:ink xmlns:inkml="http://www.w3.org/2003/InkML">
+  <inkml:definitions>
+    <inkml:context xml:id="ctx0">
+      <inkml:inkSource xml:id="inkSrc0">
+        <inkml:traceFormat>
+          <inkml:channel name="X" type="integer" min="-2.14748E9" max="2.14748E9" units="cm"/>
+          <inkml:channel name="Y" type="integer" min="-2.14748E9" max="2.14748E9" units="cm"/>
+        </inkml:traceFormat>
+        <inkml:channelProperties>
+          <inkml:channelProperty channel="X" name="resolution" value="1000" units="1/cm"/>
+          <inkml:channelProperty channel="Y" name="resolution" value="1000" units="1/cm"/>
+        </inkml:channelProperties>
+      </inkml:inkSource>
+      <inkml:timestamp xml:id="ts0" timeString="2021-01-29T17:33:55.949"/>
+    </inkml:context>
+    <inkml:brush xml:id="br0">
+      <inkml:brushProperty name="width" value="0.3" units="cm"/>
+      <inkml:brushProperty name="height" value="0.6" units="cm"/>
+      <inkml:brushProperty name="color" value="#FFFC00"/>
+      <inkml:brushProperty name="tip" value="rectangle"/>
+      <inkml:brushProperty name="rasterOp" value="maskPen"/>
+    </inkml:brush>
+  </inkml:definitions>
+  <inkml:trace contextRef="#ctx0" brushRef="#br0">1 0,'81'0,"10"0,-9 0,-22 0,3 0,-6 0,1 0,11 0,3 0,0 0,-4 0,25 0,-27 0,0 0,23 0,-35 0,2 0,0 0,-4 0,19 0,5 0,-44 0,19 0,-12 0,30 0,0 0,10 0,-12 0,-11 0,21 0,-6 9,11 0,-3 2,-12-4,-11-7,-2 0,-10 0,0 0,0 0,-8 0,-9 0,-4 6,-4-5,6 10,0-10,-6 10,5-4,-6-1,8-1,-1-5,8 7,-5-6,5 6,-8-7,0 0,-6 5,5-4,-6 9,1-9,5 11,-6-11,7 5,9-6,-7 0,15 0,-15 0,7 0,-9 5,-7-3,-1 3,-1-5,0 0,0 0,3 0,-4 0,-1 0,4 0,-3 0,0 0,3 0,-4 0</inkml:trace>
+</inkml:ink>
+</file>
+
+<file path=ppt/ink/ink8.xml><?xml version="1.0" encoding="utf-8"?>
+<inkml:ink xmlns:inkml="http://www.w3.org/2003/InkML">
+  <inkml:definitions>
+    <inkml:context xml:id="ctx0">
+      <inkml:inkSource xml:id="inkSrc0">
+        <inkml:traceFormat>
+          <inkml:channel name="X" type="integer" min="-2.14748E9" max="2.14748E9" units="cm"/>
+          <inkml:channel name="Y" type="integer" min="-2.14748E9" max="2.14748E9" units="cm"/>
+        </inkml:traceFormat>
+        <inkml:channelProperties>
+          <inkml:channelProperty channel="X" name="resolution" value="1000" units="1/cm"/>
+          <inkml:channelProperty channel="Y" name="resolution" value="1000" units="1/cm"/>
+        </inkml:channelProperties>
+      </inkml:inkSource>
+      <inkml:timestamp xml:id="ts0" timeString="2021-01-29T17:36:13.772"/>
+    </inkml:context>
+    <inkml:brush xml:id="br0">
+      <inkml:brushProperty name="width" value="0.3" units="cm"/>
+      <inkml:brushProperty name="height" value="0.6" units="cm"/>
+      <inkml:brushProperty name="color" value="#00F900"/>
+      <inkml:brushProperty name="tip" value="rectangle"/>
+      <inkml:brushProperty name="rasterOp" value="maskPen"/>
+    </inkml:brush>
+  </inkml:definitions>
+  <inkml:trace contextRef="#ctx0" brushRef="#br0">1 0,'63'0,"-13"0,-23 0,-4 0,-11 0,12 0,-12 0,10 0,-11 0,15 0,-6 0,10 0,13 0,-5 0,17 0,11 0,-7 0,10 0,-5 0,-17 0,6 7,-17 0,-3 6,-8 0,-7-2,-1 1,-6-6,4 3,-3-3,7 4,-8-4,4 3,-5 1,-5 6,4 0,-8-1,9 0,-4-4,4 4</inkml:trace>
+</inkml:ink>
+</file>
+
+<file path=ppt/ink/ink9.xml><?xml version="1.0" encoding="utf-8"?>
+<inkml:ink xmlns:inkml="http://www.w3.org/2003/InkML">
+  <inkml:definitions>
+    <inkml:context xml:id="ctx0">
+      <inkml:inkSource xml:id="inkSrc0">
+        <inkml:traceFormat>
+          <inkml:channel name="X" type="integer" min="-2.14748E9" max="2.14748E9" units="cm"/>
+          <inkml:channel name="Y" type="integer" min="-2.14748E9" max="2.14748E9" units="cm"/>
+        </inkml:traceFormat>
+        <inkml:channelProperties>
+          <inkml:channelProperty channel="X" name="resolution" value="1000" units="1/cm"/>
+          <inkml:channelProperty channel="Y" name="resolution" value="1000" units="1/cm"/>
+        </inkml:channelProperties>
+      </inkml:inkSource>
+      <inkml:timestamp xml:id="ts0" timeString="2021-01-29T17:36:19.688"/>
+    </inkml:context>
+    <inkml:brush xml:id="br0">
+      <inkml:brushProperty name="width" value="0.3" units="cm"/>
+      <inkml:brushProperty name="height" value="0.6" units="cm"/>
+      <inkml:brushProperty name="color" value="#00F900"/>
+      <inkml:brushProperty name="tip" value="rectangle"/>
+      <inkml:brushProperty name="rasterOp" value="maskPen"/>
+    </inkml:brush>
+  </inkml:definitions>
+  <inkml:trace contextRef="#ctx0" brushRef="#br0">0 81,'46'0,"7"0,-32 0,12 0,-8 0,0 0,8 0,-6 0,0 0,5 0,-11-6,12 5,-8-16,-6 14,4-8,-10 6,4 4,-3-8,-2 8,7-9,-7 9,8-8,-8 8,7-4,-4 5,0 0,4 0,-7 0,10 0,-10 0,5 0,-2 0,1 0,1 5,-2 0,-4 6,4 4,-4-3,5 3,-6-4,1-1,4 1,-4-1,5-4,-2 3,-2-7,7 2,-2-4,-1 0,3 0,-5 0,1 0,4-4,-5 3,2-3,2 4,-4 0,1 0,-2 0</inkml:trace>
+</inkml:ink>
 </file>
 
 <file path=ppt/notesMasters/notesMaster1.xml><?xml version="1.0" encoding="utf-8"?>
@@ -383,7 +835,7 @@
           <a:p>
             <a:fld id="{D0ED587F-861E-6740-9643-E3DDAE89B8D6}" type="datetimeFigureOut">
               <a:rPr lang="en-US" smtClean="0"/>
-              <a:t>9/6/20</a:t>
+              <a:t>2/1/21</a:t>
             </a:fld>
             <a:endParaRPr lang="en-US"/>
           </a:p>
@@ -715,7 +1167,7 @@
           <a:p>
             <a:fld id="{1A032F50-0B60-B34B-8422-4E195A5AE2C1}" type="slidenum">
               <a:rPr lang="en-US" smtClean="0"/>
-              <a:t>2</a:t>
+              <a:t>3</a:t>
             </a:fld>
             <a:endParaRPr lang="en-US"/>
           </a:p>
@@ -725,6 +1177,351 @@
     <p:extLst>
       <p:ext uri="{BB962C8B-B14F-4D97-AF65-F5344CB8AC3E}">
         <p14:creationId xmlns:p14="http://schemas.microsoft.com/office/powerpoint/2010/main" val="2408749350"/>
+      </p:ext>
+    </p:extLst>
+  </p:cSld>
+  <p:clrMapOvr>
+    <a:masterClrMapping/>
+  </p:clrMapOvr>
+</p:notes>
+</file>
+
+<file path=ppt/notesSlides/notesSlide2.xml><?xml version="1.0" encoding="utf-8"?>
+<p:notes xmlns:a="http://schemas.openxmlformats.org/drawingml/2006/main" xmlns:r="http://schemas.openxmlformats.org/officeDocument/2006/relationships" xmlns:p="http://schemas.openxmlformats.org/presentationml/2006/main">
+  <p:cSld>
+    <p:spTree>
+      <p:nvGrpSpPr>
+        <p:cNvPr id="1" name=""/>
+        <p:cNvGrpSpPr/>
+        <p:nvPr/>
+      </p:nvGrpSpPr>
+      <p:grpSpPr>
+        <a:xfrm>
+          <a:off x="0" y="0"/>
+          <a:ext cx="0" cy="0"/>
+          <a:chOff x="0" y="0"/>
+          <a:chExt cx="0" cy="0"/>
+        </a:xfrm>
+      </p:grpSpPr>
+      <p:sp>
+        <p:nvSpPr>
+          <p:cNvPr id="2" name="Slide Image Placeholder 1"/>
+          <p:cNvSpPr>
+            <a:spLocks noGrp="1" noRot="1" noChangeAspect="1"/>
+          </p:cNvSpPr>
+          <p:nvPr>
+            <p:ph type="sldImg"/>
+          </p:nvPr>
+        </p:nvSpPr>
+        <p:spPr/>
+      </p:sp>
+      <p:sp>
+        <p:nvSpPr>
+          <p:cNvPr id="3" name="Notes Placeholder 2"/>
+          <p:cNvSpPr>
+            <a:spLocks noGrp="1"/>
+          </p:cNvSpPr>
+          <p:nvPr>
+            <p:ph type="body" idx="1"/>
+          </p:nvPr>
+        </p:nvSpPr>
+        <p:spPr/>
+        <p:txBody>
+          <a:bodyPr/>
+          <a:lstStyle/>
+          <a:p>
+            <a:r>
+              <a:rPr lang="en-US" dirty="0"/>
+              <a:t>They key on this is pointing out we have to be very literal on every step. Else, the chicken is never removed from the boat.  - Also while writing it out, you can easily count every step</a:t>
+            </a:r>
+          </a:p>
+        </p:txBody>
+      </p:sp>
+      <p:sp>
+        <p:nvSpPr>
+          <p:cNvPr id="4" name="Slide Number Placeholder 3"/>
+          <p:cNvSpPr>
+            <a:spLocks noGrp="1"/>
+          </p:cNvSpPr>
+          <p:nvPr>
+            <p:ph type="sldNum" sz="quarter" idx="5"/>
+          </p:nvPr>
+        </p:nvSpPr>
+        <p:spPr/>
+        <p:txBody>
+          <a:bodyPr/>
+          <a:lstStyle/>
+          <a:p>
+            <a:fld id="{1A032F50-0B60-B34B-8422-4E195A5AE2C1}" type="slidenum">
+              <a:rPr lang="en-US" smtClean="0"/>
+              <a:t>4</a:t>
+            </a:fld>
+            <a:endParaRPr lang="en-US"/>
+          </a:p>
+        </p:txBody>
+      </p:sp>
+    </p:spTree>
+    <p:extLst>
+      <p:ext uri="{BB962C8B-B14F-4D97-AF65-F5344CB8AC3E}">
+        <p14:creationId xmlns:p14="http://schemas.microsoft.com/office/powerpoint/2010/main" val="692406611"/>
+      </p:ext>
+    </p:extLst>
+  </p:cSld>
+  <p:clrMapOvr>
+    <a:masterClrMapping/>
+  </p:clrMapOvr>
+</p:notes>
+</file>
+
+<file path=ppt/notesSlides/notesSlide3.xml><?xml version="1.0" encoding="utf-8"?>
+<p:notes xmlns:a="http://schemas.openxmlformats.org/drawingml/2006/main" xmlns:r="http://schemas.openxmlformats.org/officeDocument/2006/relationships" xmlns:p="http://schemas.openxmlformats.org/presentationml/2006/main">
+  <p:cSld>
+    <p:spTree>
+      <p:nvGrpSpPr>
+        <p:cNvPr id="1" name=""/>
+        <p:cNvGrpSpPr/>
+        <p:nvPr/>
+      </p:nvGrpSpPr>
+      <p:grpSpPr>
+        <a:xfrm>
+          <a:off x="0" y="0"/>
+          <a:ext cx="0" cy="0"/>
+          <a:chOff x="0" y="0"/>
+          <a:chExt cx="0" cy="0"/>
+        </a:xfrm>
+      </p:grpSpPr>
+      <p:sp>
+        <p:nvSpPr>
+          <p:cNvPr id="2" name="Slide Image Placeholder 1"/>
+          <p:cNvSpPr>
+            <a:spLocks noGrp="1" noRot="1" noChangeAspect="1"/>
+          </p:cNvSpPr>
+          <p:nvPr>
+            <p:ph type="sldImg"/>
+          </p:nvPr>
+        </p:nvSpPr>
+        <p:spPr/>
+      </p:sp>
+      <p:sp>
+        <p:nvSpPr>
+          <p:cNvPr id="3" name="Notes Placeholder 2"/>
+          <p:cNvSpPr>
+            <a:spLocks noGrp="1"/>
+          </p:cNvSpPr>
+          <p:nvPr>
+            <p:ph type="body" idx="1"/>
+          </p:nvPr>
+        </p:nvSpPr>
+        <p:spPr/>
+        <p:txBody>
+          <a:bodyPr/>
+          <a:lstStyle/>
+          <a:p>
+            <a:r>
+              <a:rPr lang="en-US" dirty="0"/>
+              <a:t>We can always develop needs for computer science faster than we can graduate people from universities or even coding boot camps. Even a *MINOR* in CS goes a long way towards job prospects. </a:t>
+            </a:r>
+          </a:p>
+        </p:txBody>
+      </p:sp>
+      <p:sp>
+        <p:nvSpPr>
+          <p:cNvPr id="4" name="Slide Number Placeholder 3"/>
+          <p:cNvSpPr>
+            <a:spLocks noGrp="1"/>
+          </p:cNvSpPr>
+          <p:nvPr>
+            <p:ph type="sldNum" sz="quarter" idx="5"/>
+          </p:nvPr>
+        </p:nvSpPr>
+        <p:spPr/>
+        <p:txBody>
+          <a:bodyPr/>
+          <a:lstStyle/>
+          <a:p>
+            <a:fld id="{1A032F50-0B60-B34B-8422-4E195A5AE2C1}" type="slidenum">
+              <a:rPr lang="en-US" smtClean="0"/>
+              <a:t>5</a:t>
+            </a:fld>
+            <a:endParaRPr lang="en-US"/>
+          </a:p>
+        </p:txBody>
+      </p:sp>
+    </p:spTree>
+    <p:extLst>
+      <p:ext uri="{BB962C8B-B14F-4D97-AF65-F5344CB8AC3E}">
+        <p14:creationId xmlns:p14="http://schemas.microsoft.com/office/powerpoint/2010/main" val="2598715987"/>
+      </p:ext>
+    </p:extLst>
+  </p:cSld>
+  <p:clrMapOvr>
+    <a:masterClrMapping/>
+  </p:clrMapOvr>
+</p:notes>
+</file>
+
+<file path=ppt/notesSlides/notesSlide4.xml><?xml version="1.0" encoding="utf-8"?>
+<p:notes xmlns:a="http://schemas.openxmlformats.org/drawingml/2006/main" xmlns:r="http://schemas.openxmlformats.org/officeDocument/2006/relationships" xmlns:p="http://schemas.openxmlformats.org/presentationml/2006/main">
+  <p:cSld>
+    <p:spTree>
+      <p:nvGrpSpPr>
+        <p:cNvPr id="1" name=""/>
+        <p:cNvGrpSpPr/>
+        <p:nvPr/>
+      </p:nvGrpSpPr>
+      <p:grpSpPr>
+        <a:xfrm>
+          <a:off x="0" y="0"/>
+          <a:ext cx="0" cy="0"/>
+          <a:chOff x="0" y="0"/>
+          <a:chExt cx="0" cy="0"/>
+        </a:xfrm>
+      </p:grpSpPr>
+      <p:sp>
+        <p:nvSpPr>
+          <p:cNvPr id="2" name="Slide Image Placeholder 1"/>
+          <p:cNvSpPr>
+            <a:spLocks noGrp="1" noRot="1" noChangeAspect="1"/>
+          </p:cNvSpPr>
+          <p:nvPr>
+            <p:ph type="sldImg"/>
+          </p:nvPr>
+        </p:nvSpPr>
+        <p:spPr/>
+      </p:sp>
+      <p:sp>
+        <p:nvSpPr>
+          <p:cNvPr id="3" name="Notes Placeholder 2"/>
+          <p:cNvSpPr>
+            <a:spLocks noGrp="1"/>
+          </p:cNvSpPr>
+          <p:nvPr>
+            <p:ph type="body" idx="1"/>
+          </p:nvPr>
+        </p:nvSpPr>
+        <p:spPr/>
+        <p:txBody>
+          <a:bodyPr/>
+          <a:lstStyle/>
+          <a:p>
+            <a:r>
+              <a:rPr lang="en-US" dirty="0"/>
+              <a:t>point out how the main method is calling the range method every time, and the range returns the value!</a:t>
+            </a:r>
+          </a:p>
+        </p:txBody>
+      </p:sp>
+      <p:sp>
+        <p:nvSpPr>
+          <p:cNvPr id="4" name="Slide Number Placeholder 3"/>
+          <p:cNvSpPr>
+            <a:spLocks noGrp="1"/>
+          </p:cNvSpPr>
+          <p:nvPr>
+            <p:ph type="sldNum" sz="quarter" idx="5"/>
+          </p:nvPr>
+        </p:nvSpPr>
+        <p:spPr/>
+        <p:txBody>
+          <a:bodyPr/>
+          <a:lstStyle/>
+          <a:p>
+            <a:fld id="{1A032F50-0B60-B34B-8422-4E195A5AE2C1}" type="slidenum">
+              <a:rPr lang="en-US" smtClean="0"/>
+              <a:t>8</a:t>
+            </a:fld>
+            <a:endParaRPr lang="en-US"/>
+          </a:p>
+        </p:txBody>
+      </p:sp>
+    </p:spTree>
+    <p:extLst>
+      <p:ext uri="{BB962C8B-B14F-4D97-AF65-F5344CB8AC3E}">
+        <p14:creationId xmlns:p14="http://schemas.microsoft.com/office/powerpoint/2010/main" val="2146360134"/>
+      </p:ext>
+    </p:extLst>
+  </p:cSld>
+  <p:clrMapOvr>
+    <a:masterClrMapping/>
+  </p:clrMapOvr>
+</p:notes>
+</file>
+
+<file path=ppt/notesSlides/notesSlide5.xml><?xml version="1.0" encoding="utf-8"?>
+<p:notes xmlns:a="http://schemas.openxmlformats.org/drawingml/2006/main" xmlns:r="http://schemas.openxmlformats.org/officeDocument/2006/relationships" xmlns:p="http://schemas.openxmlformats.org/presentationml/2006/main">
+  <p:cSld>
+    <p:spTree>
+      <p:nvGrpSpPr>
+        <p:cNvPr id="1" name=""/>
+        <p:cNvGrpSpPr/>
+        <p:nvPr/>
+      </p:nvGrpSpPr>
+      <p:grpSpPr>
+        <a:xfrm>
+          <a:off x="0" y="0"/>
+          <a:ext cx="0" cy="0"/>
+          <a:chOff x="0" y="0"/>
+          <a:chExt cx="0" cy="0"/>
+        </a:xfrm>
+      </p:grpSpPr>
+      <p:sp>
+        <p:nvSpPr>
+          <p:cNvPr id="2" name="Slide Image Placeholder 1"/>
+          <p:cNvSpPr>
+            <a:spLocks noGrp="1" noRot="1" noChangeAspect="1"/>
+          </p:cNvSpPr>
+          <p:nvPr>
+            <p:ph type="sldImg"/>
+          </p:nvPr>
+        </p:nvSpPr>
+        <p:spPr/>
+      </p:sp>
+      <p:sp>
+        <p:nvSpPr>
+          <p:cNvPr id="3" name="Notes Placeholder 2"/>
+          <p:cNvSpPr>
+            <a:spLocks noGrp="1"/>
+          </p:cNvSpPr>
+          <p:nvPr>
+            <p:ph type="body" idx="1"/>
+          </p:nvPr>
+        </p:nvSpPr>
+        <p:spPr/>
+        <p:txBody>
+          <a:bodyPr/>
+          <a:lstStyle/>
+          <a:p>
+            <a:endParaRPr lang="en-US" dirty="0"/>
+          </a:p>
+        </p:txBody>
+      </p:sp>
+      <p:sp>
+        <p:nvSpPr>
+          <p:cNvPr id="4" name="Slide Number Placeholder 3"/>
+          <p:cNvSpPr>
+            <a:spLocks noGrp="1"/>
+          </p:cNvSpPr>
+          <p:nvPr>
+            <p:ph type="sldNum" sz="quarter" idx="5"/>
+          </p:nvPr>
+        </p:nvSpPr>
+        <p:spPr/>
+        <p:txBody>
+          <a:bodyPr/>
+          <a:lstStyle/>
+          <a:p>
+            <a:fld id="{1A032F50-0B60-B34B-8422-4E195A5AE2C1}" type="slidenum">
+              <a:rPr lang="en-US" smtClean="0"/>
+              <a:t>9</a:t>
+            </a:fld>
+            <a:endParaRPr lang="en-US"/>
+          </a:p>
+        </p:txBody>
+      </p:sp>
+    </p:spTree>
+    <p:extLst>
+      <p:ext uri="{BB962C8B-B14F-4D97-AF65-F5344CB8AC3E}">
+        <p14:creationId xmlns:p14="http://schemas.microsoft.com/office/powerpoint/2010/main" val="3355322709"/>
       </p:ext>
     </p:extLst>
   </p:cSld>
@@ -6784,7 +7581,7 @@
           <a:p>
             <a:r>
               <a:rPr lang="en-US" dirty="0"/>
-              <a:t>Note: next week, a lot of classes have exams (including this one)</a:t>
+              <a:t>Note: next week, a lot of classes have exams</a:t>
             </a:r>
           </a:p>
         </p:txBody>
@@ -6836,6 +7633,273 @@
           <p:cNvPr id="4" name="Title 3">
             <a:extLst>
               <a:ext uri="{FF2B5EF4-FFF2-40B4-BE49-F238E27FC236}">
+                <a16:creationId xmlns:a16="http://schemas.microsoft.com/office/drawing/2014/main" id="{30668D3D-A98F-4D4A-9A74-661B82EECB40}"/>
+              </a:ext>
+            </a:extLst>
+          </p:cNvPr>
+          <p:cNvSpPr>
+            <a:spLocks noGrp="1"/>
+          </p:cNvSpPr>
+          <p:nvPr>
+            <p:ph type="title"/>
+          </p:nvPr>
+        </p:nvSpPr>
+        <p:spPr/>
+        <p:txBody>
+          <a:bodyPr/>
+          <a:lstStyle/>
+          <a:p>
+            <a:r>
+              <a:rPr lang="en-US" dirty="0"/>
+              <a:t>Reminders</a:t>
+            </a:r>
+          </a:p>
+        </p:txBody>
+      </p:sp>
+      <p:sp>
+        <p:nvSpPr>
+          <p:cNvPr id="5" name="Text Placeholder 4">
+            <a:extLst>
+              <a:ext uri="{FF2B5EF4-FFF2-40B4-BE49-F238E27FC236}">
+                <a16:creationId xmlns:a16="http://schemas.microsoft.com/office/drawing/2014/main" id="{0FCE6A17-A3E2-7F44-BE70-EE8499C8F0EE}"/>
+              </a:ext>
+            </a:extLst>
+          </p:cNvPr>
+          <p:cNvSpPr>
+            <a:spLocks noGrp="1"/>
+          </p:cNvSpPr>
+          <p:nvPr>
+            <p:ph type="body" sz="quarter" idx="10"/>
+          </p:nvPr>
+        </p:nvSpPr>
+        <p:spPr>
+          <a:xfrm>
+            <a:off x="628075" y="1267030"/>
+            <a:ext cx="12561453" cy="5646674"/>
+          </a:xfrm>
+        </p:spPr>
+        <p:txBody>
+          <a:bodyPr/>
+          <a:lstStyle/>
+          <a:p>
+            <a:r>
+              <a:rPr lang="en-US" dirty="0"/>
+              <a:t>Your First Paper “Why Computer Science” is Due *THURSDAY* </a:t>
+            </a:r>
+          </a:p>
+          <a:p>
+            <a:pPr lvl="1"/>
+            <a:r>
+              <a:rPr lang="en-US" dirty="0"/>
+              <a:t>Three parts: </a:t>
+            </a:r>
+          </a:p>
+          <a:p>
+            <a:pPr lvl="2"/>
+            <a:r>
+              <a:rPr lang="en-US" dirty="0"/>
+              <a:t>Your Interview</a:t>
+            </a:r>
+          </a:p>
+          <a:p>
+            <a:pPr lvl="2"/>
+            <a:r>
+              <a:rPr lang="en-US" dirty="0"/>
+              <a:t>Why you are interested in CS</a:t>
+            </a:r>
+          </a:p>
+          <a:p>
+            <a:pPr lvl="2"/>
+            <a:r>
+              <a:rPr lang="en-US" dirty="0"/>
+              <a:t>One area of CS that interests you</a:t>
+            </a:r>
+          </a:p>
+          <a:p>
+            <a:pPr lvl="3"/>
+            <a:r>
+              <a:rPr lang="en-US" dirty="0"/>
+              <a:t>with at least one citation to a source (yes, training you for citing sources)</a:t>
+            </a:r>
+          </a:p>
+          <a:p>
+            <a:pPr lvl="1"/>
+            <a:r>
+              <a:rPr lang="en-US" dirty="0"/>
+              <a:t>Follow the rubric</a:t>
+            </a:r>
+            <a:br>
+              <a:rPr lang="en-US" dirty="0"/>
+            </a:br>
+            <a:br>
+              <a:rPr lang="en-US" dirty="0"/>
+            </a:br>
+            <a:br>
+              <a:rPr lang="en-US" dirty="0"/>
+            </a:br>
+            <a:br>
+              <a:rPr lang="en-US" dirty="0"/>
+            </a:br>
+            <a:br>
+              <a:rPr lang="en-US" dirty="0"/>
+            </a:br>
+            <a:br>
+              <a:rPr lang="en-US" dirty="0"/>
+            </a:br>
+            <a:br>
+              <a:rPr lang="en-US" dirty="0"/>
+            </a:br>
+            <a:endParaRPr lang="en-US" dirty="0"/>
+          </a:p>
+          <a:p>
+            <a:r>
+              <a:rPr lang="en-US" dirty="0"/>
+              <a:t>NEXT WEEK: </a:t>
+            </a:r>
+            <a:r>
+              <a:rPr lang="en-US" b="1" dirty="0"/>
+              <a:t>No</a:t>
+            </a:r>
+            <a:r>
+              <a:rPr lang="en-US" dirty="0"/>
+              <a:t> on-campus help session (this time)</a:t>
+            </a:r>
+          </a:p>
+          <a:p>
+            <a:pPr lvl="1"/>
+            <a:r>
+              <a:rPr lang="en-US" dirty="0"/>
+              <a:t>Yes, labs will still happen on campus</a:t>
+            </a:r>
+          </a:p>
+        </p:txBody>
+      </p:sp>
+      <p:pic>
+        <p:nvPicPr>
+          <p:cNvPr id="6" name="Picture 5">
+            <a:extLst>
+              <a:ext uri="{FF2B5EF4-FFF2-40B4-BE49-F238E27FC236}">
+                <a16:creationId xmlns:a16="http://schemas.microsoft.com/office/drawing/2014/main" id="{EFB10CC3-4050-1F4C-BCC9-9FB0F2B3E037}"/>
+              </a:ext>
+            </a:extLst>
+          </p:cNvPr>
+          <p:cNvPicPr>
+            <a:picLocks noChangeAspect="1"/>
+          </p:cNvPicPr>
+          <p:nvPr/>
+        </p:nvPicPr>
+        <p:blipFill>
+          <a:blip r:embed="rId2"/>
+          <a:stretch>
+            <a:fillRect/>
+          </a:stretch>
+        </p:blipFill>
+        <p:spPr>
+          <a:xfrm>
+            <a:off x="3859078" y="3886200"/>
+            <a:ext cx="4917160" cy="2057944"/>
+          </a:xfrm>
+          <a:prstGeom prst="rect">
+            <a:avLst/>
+          </a:prstGeom>
+          <a:effectLst>
+            <a:outerShdw blurRad="50800" dist="38100" dir="2700000" algn="tl" rotWithShape="0">
+              <a:prstClr val="black">
+                <a:alpha val="40000"/>
+              </a:prstClr>
+            </a:outerShdw>
+          </a:effectLst>
+        </p:spPr>
+      </p:pic>
+      <p:sp>
+        <p:nvSpPr>
+          <p:cNvPr id="8" name="TextBox 7">
+            <a:extLst>
+              <a:ext uri="{FF2B5EF4-FFF2-40B4-BE49-F238E27FC236}">
+                <a16:creationId xmlns:a16="http://schemas.microsoft.com/office/drawing/2014/main" id="{BB2558D6-4574-2D4F-8545-28C0222B515D}"/>
+              </a:ext>
+            </a:extLst>
+          </p:cNvPr>
+          <p:cNvSpPr txBox="1"/>
+          <p:nvPr/>
+        </p:nvSpPr>
+        <p:spPr>
+          <a:xfrm>
+            <a:off x="9004515" y="4561229"/>
+            <a:ext cx="3528530" cy="707886"/>
+          </a:xfrm>
+          <a:prstGeom prst="rect">
+            <a:avLst/>
+          </a:prstGeom>
+          <a:noFill/>
+        </p:spPr>
+        <p:txBody>
+          <a:bodyPr wrap="none" rtlCol="0">
+            <a:spAutoFit/>
+          </a:bodyPr>
+          <a:lstStyle/>
+          <a:p>
+            <a:r>
+              <a:rPr lang="en-US" dirty="0"/>
+              <a:t>Just part of the rubric, </a:t>
+            </a:r>
+            <a:br>
+              <a:rPr lang="en-US" dirty="0"/>
+            </a:br>
+            <a:r>
+              <a:rPr lang="en-US" dirty="0"/>
+              <a:t>go to the assignment to see it</a:t>
+            </a:r>
+          </a:p>
+        </p:txBody>
+      </p:sp>
+    </p:spTree>
+    <p:extLst>
+      <p:ext uri="{BB962C8B-B14F-4D97-AF65-F5344CB8AC3E}">
+        <p14:creationId xmlns:p14="http://schemas.microsoft.com/office/powerpoint/2010/main" val="3671382910"/>
+      </p:ext>
+    </p:extLst>
+  </p:cSld>
+  <p:clrMapOvr>
+    <a:masterClrMapping/>
+  </p:clrMapOvr>
+  <mc:AlternateContent xmlns:mc="http://schemas.openxmlformats.org/markup-compatibility/2006" xmlns:p14="http://schemas.microsoft.com/office/powerpoint/2010/main">
+    <mc:Choice Requires="p14">
+      <p:transition p14:dur="300">
+        <p:fade/>
+      </p:transition>
+    </mc:Choice>
+    <mc:Fallback xmlns="">
+      <p:transition>
+        <p:fade/>
+      </p:transition>
+    </mc:Fallback>
+  </mc:AlternateContent>
+</p:sld>
+</file>
+
+<file path=ppt/slides/slide3.xml><?xml version="1.0" encoding="utf-8"?>
+<p:sld xmlns:a="http://schemas.openxmlformats.org/drawingml/2006/main" xmlns:r="http://schemas.openxmlformats.org/officeDocument/2006/relationships" xmlns:p="http://schemas.openxmlformats.org/presentationml/2006/main">
+  <p:cSld>
+    <p:spTree>
+      <p:nvGrpSpPr>
+        <p:cNvPr id="1" name=""/>
+        <p:cNvGrpSpPr/>
+        <p:nvPr/>
+      </p:nvGrpSpPr>
+      <p:grpSpPr>
+        <a:xfrm>
+          <a:off x="0" y="0"/>
+          <a:ext cx="0" cy="0"/>
+          <a:chOff x="0" y="0"/>
+          <a:chExt cx="0" cy="0"/>
+        </a:xfrm>
+      </p:grpSpPr>
+      <p:sp>
+        <p:nvSpPr>
+          <p:cNvPr id="4" name="Title 3">
+            <a:extLst>
+              <a:ext uri="{FF2B5EF4-FFF2-40B4-BE49-F238E27FC236}">
                 <a16:creationId xmlns:a16="http://schemas.microsoft.com/office/drawing/2014/main" id="{A3AB100F-EEA5-B940-91CC-5DD4C4CC72D7}"/>
               </a:ext>
             </a:extLst>
@@ -6988,7 +8052,1904 @@
 </p:sld>
 </file>
 
-<file path=ppt/slides/slide3.xml><?xml version="1.0" encoding="utf-8"?>
+<file path=ppt/slides/slide4.xml><?xml version="1.0" encoding="utf-8"?>
+<p:sld xmlns:a="http://schemas.openxmlformats.org/drawingml/2006/main" xmlns:r="http://schemas.openxmlformats.org/officeDocument/2006/relationships" xmlns:p="http://schemas.openxmlformats.org/presentationml/2006/main">
+  <p:cSld>
+    <p:spTree>
+      <p:nvGrpSpPr>
+        <p:cNvPr id="1" name=""/>
+        <p:cNvGrpSpPr/>
+        <p:nvPr/>
+      </p:nvGrpSpPr>
+      <p:grpSpPr>
+        <a:xfrm>
+          <a:off x="0" y="0"/>
+          <a:ext cx="0" cy="0"/>
+          <a:chOff x="0" y="0"/>
+          <a:chExt cx="0" cy="0"/>
+        </a:xfrm>
+      </p:grpSpPr>
+      <p:sp>
+        <p:nvSpPr>
+          <p:cNvPr id="2" name="Title 1">
+            <a:extLst>
+              <a:ext uri="{FF2B5EF4-FFF2-40B4-BE49-F238E27FC236}">
+                <a16:creationId xmlns:a16="http://schemas.microsoft.com/office/drawing/2014/main" id="{3C9621DA-8B60-B247-AF8C-19D97D2B4C41}"/>
+              </a:ext>
+            </a:extLst>
+          </p:cNvPr>
+          <p:cNvSpPr>
+            <a:spLocks noGrp="1"/>
+          </p:cNvSpPr>
+          <p:nvPr>
+            <p:ph type="title"/>
+          </p:nvPr>
+        </p:nvSpPr>
+        <p:spPr/>
+        <p:txBody>
+          <a:bodyPr/>
+          <a:lstStyle/>
+          <a:p>
+            <a:r>
+              <a:rPr lang="en-US" dirty="0"/>
+              <a:t>Farmer Solution</a:t>
+            </a:r>
+          </a:p>
+        </p:txBody>
+      </p:sp>
+      <p:sp>
+        <p:nvSpPr>
+          <p:cNvPr id="3" name="Text Placeholder 2">
+            <a:extLst>
+              <a:ext uri="{FF2B5EF4-FFF2-40B4-BE49-F238E27FC236}">
+                <a16:creationId xmlns:a16="http://schemas.microsoft.com/office/drawing/2014/main" id="{7412575E-0AD9-DD4A-8339-9833275FAD43}"/>
+              </a:ext>
+            </a:extLst>
+          </p:cNvPr>
+          <p:cNvSpPr>
+            <a:spLocks noGrp="1"/>
+          </p:cNvSpPr>
+          <p:nvPr>
+            <p:ph type="body" sz="quarter" idx="10"/>
+          </p:nvPr>
+        </p:nvSpPr>
+        <p:spPr>
+          <a:xfrm>
+            <a:off x="628075" y="1776684"/>
+            <a:ext cx="12561453" cy="4970591"/>
+          </a:xfrm>
+        </p:spPr>
+        <p:txBody>
+          <a:bodyPr numCol="2"/>
+          <a:lstStyle/>
+          <a:p>
+            <a:pPr>
+              <a:buFont typeface="+mj-lt"/>
+              <a:buAutoNum type="arabicPeriod"/>
+            </a:pPr>
+            <a:r>
+              <a:rPr lang="en-US" dirty="0"/>
+              <a:t>Row the boat with chicken across the river</a:t>
+            </a:r>
+          </a:p>
+          <a:p>
+            <a:pPr>
+              <a:buFont typeface="+mj-lt"/>
+              <a:buAutoNum type="arabicPeriod"/>
+            </a:pPr>
+            <a:r>
+              <a:rPr lang="en-US" dirty="0"/>
+              <a:t>Take chicken out of boat and set on bank</a:t>
+            </a:r>
+          </a:p>
+          <a:p>
+            <a:pPr>
+              <a:buFont typeface="+mj-lt"/>
+              <a:buAutoNum type="arabicPeriod"/>
+            </a:pPr>
+            <a:r>
+              <a:rPr lang="en-US" dirty="0"/>
+              <a:t>Row the boat back</a:t>
+            </a:r>
+          </a:p>
+          <a:p>
+            <a:pPr>
+              <a:buFont typeface="+mj-lt"/>
+              <a:buAutoNum type="arabicPeriod"/>
+            </a:pPr>
+            <a:r>
+              <a:rPr lang="en-US" dirty="0"/>
+              <a:t>Put the fox in the boat</a:t>
+            </a:r>
+          </a:p>
+          <a:p>
+            <a:pPr>
+              <a:buFont typeface="+mj-lt"/>
+              <a:buAutoNum type="arabicPeriod"/>
+            </a:pPr>
+            <a:r>
+              <a:rPr lang="en-US" dirty="0"/>
+              <a:t>Row the boat with fox across the river</a:t>
+            </a:r>
+          </a:p>
+          <a:p>
+            <a:pPr>
+              <a:buFont typeface="+mj-lt"/>
+              <a:buAutoNum type="arabicPeriod"/>
+            </a:pPr>
+            <a:r>
+              <a:rPr lang="en-US" dirty="0"/>
+              <a:t>Take the fox out of the boat</a:t>
+            </a:r>
+          </a:p>
+          <a:p>
+            <a:pPr>
+              <a:buFont typeface="+mj-lt"/>
+              <a:buAutoNum type="arabicPeriod"/>
+            </a:pPr>
+            <a:r>
+              <a:rPr lang="en-US" dirty="0"/>
+              <a:t>Put the chicken in the boat</a:t>
+            </a:r>
+          </a:p>
+          <a:p>
+            <a:pPr>
+              <a:buFont typeface="+mj-lt"/>
+              <a:buAutoNum type="arabicPeriod"/>
+            </a:pPr>
+            <a:r>
+              <a:rPr lang="en-US" dirty="0"/>
+              <a:t>Row the boat back with chicken across the river</a:t>
+            </a:r>
+          </a:p>
+          <a:p>
+            <a:pPr>
+              <a:buFont typeface="+mj-lt"/>
+              <a:buAutoNum type="arabicPeriod"/>
+            </a:pPr>
+            <a:r>
+              <a:rPr lang="en-US" dirty="0"/>
+              <a:t>Take chicken out of boat</a:t>
+            </a:r>
+          </a:p>
+          <a:p>
+            <a:pPr>
+              <a:buFont typeface="+mj-lt"/>
+              <a:buAutoNum type="arabicPeriod"/>
+            </a:pPr>
+            <a:r>
+              <a:rPr lang="en-US" dirty="0"/>
+              <a:t>Put the grain in the boat</a:t>
+            </a:r>
+          </a:p>
+          <a:p>
+            <a:pPr>
+              <a:buFont typeface="+mj-lt"/>
+              <a:buAutoNum type="arabicPeriod"/>
+            </a:pPr>
+            <a:r>
+              <a:rPr lang="en-US" dirty="0"/>
+              <a:t>Row the boat with grain across the river</a:t>
+            </a:r>
+          </a:p>
+          <a:p>
+            <a:pPr>
+              <a:buFont typeface="+mj-lt"/>
+              <a:buAutoNum type="arabicPeriod"/>
+            </a:pPr>
+            <a:r>
+              <a:rPr lang="en-US" dirty="0"/>
+              <a:t>Take the grain out of the boat</a:t>
+            </a:r>
+          </a:p>
+          <a:p>
+            <a:pPr>
+              <a:buFont typeface="+mj-lt"/>
+              <a:buAutoNum type="arabicPeriod"/>
+            </a:pPr>
+            <a:r>
+              <a:rPr lang="en-US" dirty="0"/>
+              <a:t>Row the boat back</a:t>
+            </a:r>
+          </a:p>
+          <a:p>
+            <a:pPr>
+              <a:buFont typeface="+mj-lt"/>
+              <a:buAutoNum type="arabicPeriod"/>
+            </a:pPr>
+            <a:r>
+              <a:rPr lang="en-US" dirty="0"/>
+              <a:t>Put chicken in the boat</a:t>
+            </a:r>
+          </a:p>
+          <a:p>
+            <a:pPr>
+              <a:buFont typeface="+mj-lt"/>
+              <a:buAutoNum type="arabicPeriod"/>
+            </a:pPr>
+            <a:r>
+              <a:rPr lang="en-US" dirty="0"/>
+              <a:t>Row the boat with chicken across river</a:t>
+            </a:r>
+          </a:p>
+          <a:p>
+            <a:pPr>
+              <a:buFont typeface="+mj-lt"/>
+              <a:buAutoNum type="arabicPeriod"/>
+            </a:pPr>
+            <a:r>
+              <a:rPr lang="en-US" dirty="0"/>
+              <a:t>Take chicken out of boat</a:t>
+            </a:r>
+          </a:p>
+          <a:p>
+            <a:pPr>
+              <a:buFont typeface="+mj-lt"/>
+              <a:buAutoNum type="arabicPeriod"/>
+            </a:pPr>
+            <a:r>
+              <a:rPr lang="en-US" dirty="0"/>
+              <a:t>Return home with grain, chicken, fox</a:t>
+            </a:r>
+          </a:p>
+        </p:txBody>
+      </p:sp>
+      <p:sp>
+        <p:nvSpPr>
+          <p:cNvPr id="4" name="TextBox 3">
+            <a:extLst>
+              <a:ext uri="{FF2B5EF4-FFF2-40B4-BE49-F238E27FC236}">
+                <a16:creationId xmlns:a16="http://schemas.microsoft.com/office/drawing/2014/main" id="{F1D25E1B-5C12-5A45-A5D2-4F57BAE2FB32}"/>
+              </a:ext>
+            </a:extLst>
+          </p:cNvPr>
+          <p:cNvSpPr txBox="1"/>
+          <p:nvPr/>
+        </p:nvSpPr>
+        <p:spPr>
+          <a:xfrm>
+            <a:off x="7578437" y="6206837"/>
+            <a:ext cx="4479111" cy="400110"/>
+          </a:xfrm>
+          <a:prstGeom prst="rect">
+            <a:avLst/>
+          </a:prstGeom>
+          <a:noFill/>
+        </p:spPr>
+        <p:txBody>
+          <a:bodyPr wrap="none" rtlCol="0">
+            <a:spAutoFit/>
+          </a:bodyPr>
+          <a:lstStyle/>
+          <a:p>
+            <a:r>
+              <a:rPr lang="en-US" dirty="0"/>
+              <a:t>17-21 steps! (maybe some for farmer)</a:t>
+            </a:r>
+          </a:p>
+        </p:txBody>
+      </p:sp>
+      <mc:AlternateContent xmlns:mc="http://schemas.openxmlformats.org/markup-compatibility/2006" xmlns:p14="http://schemas.microsoft.com/office/powerpoint/2010/main">
+        <mc:Choice Requires="p14">
+          <p:contentPart p14:bwMode="auto" r:id="rId3">
+            <p14:nvContentPartPr>
+              <p14:cNvPr id="8" name="Ink 7">
+                <a:extLst>
+                  <a:ext uri="{FF2B5EF4-FFF2-40B4-BE49-F238E27FC236}">
+                    <a16:creationId xmlns:a16="http://schemas.microsoft.com/office/drawing/2014/main" id="{0FE9821E-F44C-D341-AA90-00DF9580D2C6}"/>
+                  </a:ext>
+                </a:extLst>
+              </p14:cNvPr>
+              <p14:cNvContentPartPr/>
+              <p14:nvPr/>
+            </p14:nvContentPartPr>
+            <p14:xfrm>
+              <a:off x="1236469" y="2010731"/>
+              <a:ext cx="1351440" cy="89280"/>
+            </p14:xfrm>
+          </p:contentPart>
+        </mc:Choice>
+        <mc:Fallback xmlns="">
+          <p:pic>
+            <p:nvPicPr>
+              <p:cNvPr id="8" name="Ink 7">
+                <a:extLst>
+                  <a:ext uri="{FF2B5EF4-FFF2-40B4-BE49-F238E27FC236}">
+                    <a16:creationId xmlns:a16="http://schemas.microsoft.com/office/drawing/2014/main" id="{0FE9821E-F44C-D341-AA90-00DF9580D2C6}"/>
+                  </a:ext>
+                </a:extLst>
+              </p:cNvPr>
+              <p:cNvPicPr/>
+              <p:nvPr/>
+            </p:nvPicPr>
+            <p:blipFill>
+              <a:blip r:embed="rId4"/>
+              <a:stretch>
+                <a:fillRect/>
+              </a:stretch>
+            </p:blipFill>
+            <p:spPr>
+              <a:xfrm>
+                <a:off x="1182469" y="1902731"/>
+                <a:ext cx="1459080" cy="304920"/>
+              </a:xfrm>
+              <a:prstGeom prst="rect">
+                <a:avLst/>
+              </a:prstGeom>
+            </p:spPr>
+          </p:pic>
+        </mc:Fallback>
+      </mc:AlternateContent>
+      <mc:AlternateContent xmlns:mc="http://schemas.openxmlformats.org/markup-compatibility/2006" xmlns:p14="http://schemas.microsoft.com/office/powerpoint/2010/main">
+        <mc:Choice Requires="p14">
+          <p:contentPart p14:bwMode="auto" r:id="rId5">
+            <p14:nvContentPartPr>
+              <p14:cNvPr id="9" name="Ink 8">
+                <a:extLst>
+                  <a:ext uri="{FF2B5EF4-FFF2-40B4-BE49-F238E27FC236}">
+                    <a16:creationId xmlns:a16="http://schemas.microsoft.com/office/drawing/2014/main" id="{895E916D-2C30-B644-AF14-83D261AFAF14}"/>
+                  </a:ext>
+                </a:extLst>
+              </p14:cNvPr>
+              <p14:cNvContentPartPr/>
+              <p14:nvPr/>
+            </p14:nvContentPartPr>
+            <p14:xfrm>
+              <a:off x="1230709" y="2947811"/>
+              <a:ext cx="1348920" cy="89640"/>
+            </p14:xfrm>
+          </p:contentPart>
+        </mc:Choice>
+        <mc:Fallback xmlns="">
+          <p:pic>
+            <p:nvPicPr>
+              <p:cNvPr id="9" name="Ink 8">
+                <a:extLst>
+                  <a:ext uri="{FF2B5EF4-FFF2-40B4-BE49-F238E27FC236}">
+                    <a16:creationId xmlns:a16="http://schemas.microsoft.com/office/drawing/2014/main" id="{895E916D-2C30-B644-AF14-83D261AFAF14}"/>
+                  </a:ext>
+                </a:extLst>
+              </p:cNvPr>
+              <p:cNvPicPr/>
+              <p:nvPr/>
+            </p:nvPicPr>
+            <p:blipFill>
+              <a:blip r:embed="rId6"/>
+              <a:stretch>
+                <a:fillRect/>
+              </a:stretch>
+            </p:blipFill>
+            <p:spPr>
+              <a:xfrm>
+                <a:off x="1176709" y="2839811"/>
+                <a:ext cx="1456560" cy="305280"/>
+              </a:xfrm>
+              <a:prstGeom prst="rect">
+                <a:avLst/>
+              </a:prstGeom>
+            </p:spPr>
+          </p:pic>
+        </mc:Fallback>
+      </mc:AlternateContent>
+      <mc:AlternateContent xmlns:mc="http://schemas.openxmlformats.org/markup-compatibility/2006" xmlns:p14="http://schemas.microsoft.com/office/powerpoint/2010/main">
+        <mc:Choice Requires="p14">
+          <p:contentPart p14:bwMode="auto" r:id="rId7">
+            <p14:nvContentPartPr>
+              <p14:cNvPr id="10" name="Ink 9">
+                <a:extLst>
+                  <a:ext uri="{FF2B5EF4-FFF2-40B4-BE49-F238E27FC236}">
+                    <a16:creationId xmlns:a16="http://schemas.microsoft.com/office/drawing/2014/main" id="{DC5E8DC5-968E-D84B-BB85-40C0989AC037}"/>
+                  </a:ext>
+                </a:extLst>
+              </p14:cNvPr>
+              <p14:cNvContentPartPr/>
+              <p14:nvPr/>
+            </p14:nvContentPartPr>
+            <p14:xfrm>
+              <a:off x="1281469" y="3971291"/>
+              <a:ext cx="1413720" cy="32760"/>
+            </p14:xfrm>
+          </p:contentPart>
+        </mc:Choice>
+        <mc:Fallback xmlns="">
+          <p:pic>
+            <p:nvPicPr>
+              <p:cNvPr id="10" name="Ink 9">
+                <a:extLst>
+                  <a:ext uri="{FF2B5EF4-FFF2-40B4-BE49-F238E27FC236}">
+                    <a16:creationId xmlns:a16="http://schemas.microsoft.com/office/drawing/2014/main" id="{DC5E8DC5-968E-D84B-BB85-40C0989AC037}"/>
+                  </a:ext>
+                </a:extLst>
+              </p:cNvPr>
+              <p:cNvPicPr/>
+              <p:nvPr/>
+            </p:nvPicPr>
+            <p:blipFill>
+              <a:blip r:embed="rId8"/>
+              <a:stretch>
+                <a:fillRect/>
+              </a:stretch>
+            </p:blipFill>
+            <p:spPr>
+              <a:xfrm>
+                <a:off x="1227469" y="3863291"/>
+                <a:ext cx="1521360" cy="248400"/>
+              </a:xfrm>
+              <a:prstGeom prst="rect">
+                <a:avLst/>
+              </a:prstGeom>
+            </p:spPr>
+          </p:pic>
+        </mc:Fallback>
+      </mc:AlternateContent>
+      <mc:AlternateContent xmlns:mc="http://schemas.openxmlformats.org/markup-compatibility/2006" xmlns:p14="http://schemas.microsoft.com/office/powerpoint/2010/main">
+        <mc:Choice Requires="p14">
+          <p:contentPart p14:bwMode="auto" r:id="rId9">
+            <p14:nvContentPartPr>
+              <p14:cNvPr id="12" name="Ink 11">
+                <a:extLst>
+                  <a:ext uri="{FF2B5EF4-FFF2-40B4-BE49-F238E27FC236}">
+                    <a16:creationId xmlns:a16="http://schemas.microsoft.com/office/drawing/2014/main" id="{EC7D38E9-159D-DE46-A873-F829F27B0C71}"/>
+                  </a:ext>
+                </a:extLst>
+              </p14:cNvPr>
+              <p14:cNvContentPartPr/>
+              <p14:nvPr/>
+            </p14:nvContentPartPr>
+            <p14:xfrm>
+              <a:off x="1289389" y="5345051"/>
+              <a:ext cx="1293480" cy="34560"/>
+            </p14:xfrm>
+          </p:contentPart>
+        </mc:Choice>
+        <mc:Fallback xmlns="">
+          <p:pic>
+            <p:nvPicPr>
+              <p:cNvPr id="12" name="Ink 11">
+                <a:extLst>
+                  <a:ext uri="{FF2B5EF4-FFF2-40B4-BE49-F238E27FC236}">
+                    <a16:creationId xmlns:a16="http://schemas.microsoft.com/office/drawing/2014/main" id="{EC7D38E9-159D-DE46-A873-F829F27B0C71}"/>
+                  </a:ext>
+                </a:extLst>
+              </p:cNvPr>
+              <p:cNvPicPr/>
+              <p:nvPr/>
+            </p:nvPicPr>
+            <p:blipFill>
+              <a:blip r:embed="rId10"/>
+              <a:stretch>
+                <a:fillRect/>
+              </a:stretch>
+            </p:blipFill>
+            <p:spPr>
+              <a:xfrm>
+                <a:off x="1235389" y="5237411"/>
+                <a:ext cx="1401120" cy="250200"/>
+              </a:xfrm>
+              <a:prstGeom prst="rect">
+                <a:avLst/>
+              </a:prstGeom>
+            </p:spPr>
+          </p:pic>
+        </mc:Fallback>
+      </mc:AlternateContent>
+      <mc:AlternateContent xmlns:mc="http://schemas.openxmlformats.org/markup-compatibility/2006" xmlns:p14="http://schemas.microsoft.com/office/powerpoint/2010/main">
+        <mc:Choice Requires="p14">
+          <p:contentPart p14:bwMode="auto" r:id="rId11">
+            <p14:nvContentPartPr>
+              <p14:cNvPr id="13" name="Ink 12">
+                <a:extLst>
+                  <a:ext uri="{FF2B5EF4-FFF2-40B4-BE49-F238E27FC236}">
+                    <a16:creationId xmlns:a16="http://schemas.microsoft.com/office/drawing/2014/main" id="{64ACEE91-0CBC-FC40-92BF-200F3883E6C0}"/>
+                  </a:ext>
+                </a:extLst>
+              </p14:cNvPr>
+              <p14:cNvContentPartPr/>
+              <p14:nvPr/>
+            </p14:nvContentPartPr>
+            <p14:xfrm>
+              <a:off x="7472029" y="2034851"/>
+              <a:ext cx="1250640" cy="25560"/>
+            </p14:xfrm>
+          </p:contentPart>
+        </mc:Choice>
+        <mc:Fallback xmlns="">
+          <p:pic>
+            <p:nvPicPr>
+              <p:cNvPr id="13" name="Ink 12">
+                <a:extLst>
+                  <a:ext uri="{FF2B5EF4-FFF2-40B4-BE49-F238E27FC236}">
+                    <a16:creationId xmlns:a16="http://schemas.microsoft.com/office/drawing/2014/main" id="{64ACEE91-0CBC-FC40-92BF-200F3883E6C0}"/>
+                  </a:ext>
+                </a:extLst>
+              </p:cNvPr>
+              <p:cNvPicPr/>
+              <p:nvPr/>
+            </p:nvPicPr>
+            <p:blipFill>
+              <a:blip r:embed="rId12"/>
+              <a:stretch>
+                <a:fillRect/>
+              </a:stretch>
+            </p:blipFill>
+            <p:spPr>
+              <a:xfrm>
+                <a:off x="7418389" y="1927211"/>
+                <a:ext cx="1358280" cy="241200"/>
+              </a:xfrm>
+              <a:prstGeom prst="rect">
+                <a:avLst/>
+              </a:prstGeom>
+            </p:spPr>
+          </p:pic>
+        </mc:Fallback>
+      </mc:AlternateContent>
+      <mc:AlternateContent xmlns:mc="http://schemas.openxmlformats.org/markup-compatibility/2006" xmlns:p14="http://schemas.microsoft.com/office/powerpoint/2010/main">
+        <mc:Choice Requires="p14">
+          <p:contentPart p14:bwMode="auto" r:id="rId13">
+            <p14:nvContentPartPr>
+              <p14:cNvPr id="14" name="Ink 13">
+                <a:extLst>
+                  <a:ext uri="{FF2B5EF4-FFF2-40B4-BE49-F238E27FC236}">
+                    <a16:creationId xmlns:a16="http://schemas.microsoft.com/office/drawing/2014/main" id="{C68614D5-C1F6-A04C-9B77-7BDACE2EFE71}"/>
+                  </a:ext>
+                </a:extLst>
+              </p14:cNvPr>
+              <p14:cNvContentPartPr/>
+              <p14:nvPr/>
+            </p14:nvContentPartPr>
+            <p14:xfrm>
+              <a:off x="7493989" y="2934851"/>
+              <a:ext cx="1279080" cy="33120"/>
+            </p14:xfrm>
+          </p:contentPart>
+        </mc:Choice>
+        <mc:Fallback xmlns="">
+          <p:pic>
+            <p:nvPicPr>
+              <p:cNvPr id="14" name="Ink 13">
+                <a:extLst>
+                  <a:ext uri="{FF2B5EF4-FFF2-40B4-BE49-F238E27FC236}">
+                    <a16:creationId xmlns:a16="http://schemas.microsoft.com/office/drawing/2014/main" id="{C68614D5-C1F6-A04C-9B77-7BDACE2EFE71}"/>
+                  </a:ext>
+                </a:extLst>
+              </p:cNvPr>
+              <p:cNvPicPr/>
+              <p:nvPr/>
+            </p:nvPicPr>
+            <p:blipFill>
+              <a:blip r:embed="rId14"/>
+              <a:stretch>
+                <a:fillRect/>
+              </a:stretch>
+            </p:blipFill>
+            <p:spPr>
+              <a:xfrm>
+                <a:off x="7440349" y="2826851"/>
+                <a:ext cx="1386720" cy="248760"/>
+              </a:xfrm>
+              <a:prstGeom prst="rect">
+                <a:avLst/>
+              </a:prstGeom>
+            </p:spPr>
+          </p:pic>
+        </mc:Fallback>
+      </mc:AlternateContent>
+      <mc:AlternateContent xmlns:mc="http://schemas.openxmlformats.org/markup-compatibility/2006" xmlns:p14="http://schemas.microsoft.com/office/powerpoint/2010/main">
+        <mc:Choice Requires="p14">
+          <p:contentPart p14:bwMode="auto" r:id="rId15">
+            <p14:nvContentPartPr>
+              <p14:cNvPr id="15" name="Ink 14">
+                <a:extLst>
+                  <a:ext uri="{FF2B5EF4-FFF2-40B4-BE49-F238E27FC236}">
+                    <a16:creationId xmlns:a16="http://schemas.microsoft.com/office/drawing/2014/main" id="{F8CA8228-AD1D-C843-B1B7-8D57940F9D5A}"/>
+                  </a:ext>
+                </a:extLst>
+              </p14:cNvPr>
+              <p14:cNvContentPartPr/>
+              <p14:nvPr/>
+            </p14:nvContentPartPr>
+            <p14:xfrm>
+              <a:off x="7488589" y="3953651"/>
+              <a:ext cx="1256760" cy="53280"/>
+            </p14:xfrm>
+          </p:contentPart>
+        </mc:Choice>
+        <mc:Fallback xmlns="">
+          <p:pic>
+            <p:nvPicPr>
+              <p:cNvPr id="15" name="Ink 14">
+                <a:extLst>
+                  <a:ext uri="{FF2B5EF4-FFF2-40B4-BE49-F238E27FC236}">
+                    <a16:creationId xmlns:a16="http://schemas.microsoft.com/office/drawing/2014/main" id="{F8CA8228-AD1D-C843-B1B7-8D57940F9D5A}"/>
+                  </a:ext>
+                </a:extLst>
+              </p:cNvPr>
+              <p:cNvPicPr/>
+              <p:nvPr/>
+            </p:nvPicPr>
+            <p:blipFill>
+              <a:blip r:embed="rId16"/>
+              <a:stretch>
+                <a:fillRect/>
+              </a:stretch>
+            </p:blipFill>
+            <p:spPr>
+              <a:xfrm>
+                <a:off x="7434949" y="3845651"/>
+                <a:ext cx="1364400" cy="268920"/>
+              </a:xfrm>
+              <a:prstGeom prst="rect">
+                <a:avLst/>
+              </a:prstGeom>
+            </p:spPr>
+          </p:pic>
+        </mc:Fallback>
+      </mc:AlternateContent>
+      <mc:AlternateContent xmlns:mc="http://schemas.openxmlformats.org/markup-compatibility/2006" xmlns:p14="http://schemas.microsoft.com/office/powerpoint/2010/main">
+        <mc:Choice Requires="p14">
+          <p:contentPart p14:bwMode="auto" r:id="rId17">
+            <p14:nvContentPartPr>
+              <p14:cNvPr id="16" name="Ink 15">
+                <a:extLst>
+                  <a:ext uri="{FF2B5EF4-FFF2-40B4-BE49-F238E27FC236}">
+                    <a16:creationId xmlns:a16="http://schemas.microsoft.com/office/drawing/2014/main" id="{4F78C3E9-6CCA-804E-B213-241D6262FA2C}"/>
+                  </a:ext>
+                </a:extLst>
+              </p14:cNvPr>
+              <p14:cNvContentPartPr/>
+              <p14:nvPr/>
+            </p14:nvContentPartPr>
+            <p14:xfrm>
+              <a:off x="1305589" y="2528411"/>
+              <a:ext cx="388080" cy="74880"/>
+            </p14:xfrm>
+          </p:contentPart>
+        </mc:Choice>
+        <mc:Fallback xmlns="">
+          <p:pic>
+            <p:nvPicPr>
+              <p:cNvPr id="16" name="Ink 15">
+                <a:extLst>
+                  <a:ext uri="{FF2B5EF4-FFF2-40B4-BE49-F238E27FC236}">
+                    <a16:creationId xmlns:a16="http://schemas.microsoft.com/office/drawing/2014/main" id="{4F78C3E9-6CCA-804E-B213-241D6262FA2C}"/>
+                  </a:ext>
+                </a:extLst>
+              </p:cNvPr>
+              <p:cNvPicPr/>
+              <p:nvPr/>
+            </p:nvPicPr>
+            <p:blipFill>
+              <a:blip r:embed="rId18"/>
+              <a:stretch>
+                <a:fillRect/>
+              </a:stretch>
+            </p:blipFill>
+            <p:spPr>
+              <a:xfrm>
+                <a:off x="1251949" y="2420411"/>
+                <a:ext cx="495720" cy="290520"/>
+              </a:xfrm>
+              <a:prstGeom prst="rect">
+                <a:avLst/>
+              </a:prstGeom>
+            </p:spPr>
+          </p:pic>
+        </mc:Fallback>
+      </mc:AlternateContent>
+      <mc:AlternateContent xmlns:mc="http://schemas.openxmlformats.org/markup-compatibility/2006" xmlns:p14="http://schemas.microsoft.com/office/powerpoint/2010/main">
+        <mc:Choice Requires="p14">
+          <p:contentPart p14:bwMode="auto" r:id="rId19">
+            <p14:nvContentPartPr>
+              <p14:cNvPr id="17" name="Ink 16">
+                <a:extLst>
+                  <a:ext uri="{FF2B5EF4-FFF2-40B4-BE49-F238E27FC236}">
+                    <a16:creationId xmlns:a16="http://schemas.microsoft.com/office/drawing/2014/main" id="{12ADFEEF-129B-1E45-9642-C4B8A8859728}"/>
+                  </a:ext>
+                </a:extLst>
+              </p14:cNvPr>
+              <p14:cNvContentPartPr/>
+              <p14:nvPr/>
+            </p14:nvContentPartPr>
+            <p14:xfrm>
+              <a:off x="1301629" y="4420211"/>
+              <a:ext cx="398880" cy="45720"/>
+            </p14:xfrm>
+          </p:contentPart>
+        </mc:Choice>
+        <mc:Fallback xmlns="">
+          <p:pic>
+            <p:nvPicPr>
+              <p:cNvPr id="17" name="Ink 16">
+                <a:extLst>
+                  <a:ext uri="{FF2B5EF4-FFF2-40B4-BE49-F238E27FC236}">
+                    <a16:creationId xmlns:a16="http://schemas.microsoft.com/office/drawing/2014/main" id="{12ADFEEF-129B-1E45-9642-C4B8A8859728}"/>
+                  </a:ext>
+                </a:extLst>
+              </p:cNvPr>
+              <p:cNvPicPr/>
+              <p:nvPr/>
+            </p:nvPicPr>
+            <p:blipFill>
+              <a:blip r:embed="rId20"/>
+              <a:stretch>
+                <a:fillRect/>
+              </a:stretch>
+            </p:blipFill>
+            <p:spPr>
+              <a:xfrm>
+                <a:off x="1247629" y="4312571"/>
+                <a:ext cx="506520" cy="261360"/>
+              </a:xfrm>
+              <a:prstGeom prst="rect">
+                <a:avLst/>
+              </a:prstGeom>
+            </p:spPr>
+          </p:pic>
+        </mc:Fallback>
+      </mc:AlternateContent>
+      <mc:AlternateContent xmlns:mc="http://schemas.openxmlformats.org/markup-compatibility/2006" xmlns:p14="http://schemas.microsoft.com/office/powerpoint/2010/main">
+        <mc:Choice Requires="p14">
+          <p:contentPart p14:bwMode="auto" r:id="rId21">
+            <p14:nvContentPartPr>
+              <p14:cNvPr id="18" name="Ink 17">
+                <a:extLst>
+                  <a:ext uri="{FF2B5EF4-FFF2-40B4-BE49-F238E27FC236}">
+                    <a16:creationId xmlns:a16="http://schemas.microsoft.com/office/drawing/2014/main" id="{521CE7A8-F2F5-C942-9ED4-626A101A29A0}"/>
+                  </a:ext>
+                </a:extLst>
+              </p14:cNvPr>
+              <p14:cNvContentPartPr/>
+              <p14:nvPr/>
+            </p14:nvContentPartPr>
+            <p14:xfrm>
+              <a:off x="1316749" y="5875691"/>
+              <a:ext cx="363960" cy="52560"/>
+            </p14:xfrm>
+          </p:contentPart>
+        </mc:Choice>
+        <mc:Fallback xmlns="">
+          <p:pic>
+            <p:nvPicPr>
+              <p:cNvPr id="18" name="Ink 17">
+                <a:extLst>
+                  <a:ext uri="{FF2B5EF4-FFF2-40B4-BE49-F238E27FC236}">
+                    <a16:creationId xmlns:a16="http://schemas.microsoft.com/office/drawing/2014/main" id="{521CE7A8-F2F5-C942-9ED4-626A101A29A0}"/>
+                  </a:ext>
+                </a:extLst>
+              </p:cNvPr>
+              <p:cNvPicPr/>
+              <p:nvPr/>
+            </p:nvPicPr>
+            <p:blipFill>
+              <a:blip r:embed="rId22"/>
+              <a:stretch>
+                <a:fillRect/>
+              </a:stretch>
+            </p:blipFill>
+            <p:spPr>
+              <a:xfrm>
+                <a:off x="1262749" y="5767691"/>
+                <a:ext cx="471600" cy="268200"/>
+              </a:xfrm>
+              <a:prstGeom prst="rect">
+                <a:avLst/>
+              </a:prstGeom>
+            </p:spPr>
+          </p:pic>
+        </mc:Fallback>
+      </mc:AlternateContent>
+      <mc:AlternateContent xmlns:mc="http://schemas.openxmlformats.org/markup-compatibility/2006" xmlns:p14="http://schemas.microsoft.com/office/powerpoint/2010/main">
+        <mc:Choice Requires="p14">
+          <p:contentPart p14:bwMode="auto" r:id="rId23">
+            <p14:nvContentPartPr>
+              <p14:cNvPr id="19" name="Ink 18">
+                <a:extLst>
+                  <a:ext uri="{FF2B5EF4-FFF2-40B4-BE49-F238E27FC236}">
+                    <a16:creationId xmlns:a16="http://schemas.microsoft.com/office/drawing/2014/main" id="{93F3F115-68FB-AE4B-9786-3BDA56B767D4}"/>
+                  </a:ext>
+                </a:extLst>
+              </p14:cNvPr>
+              <p14:cNvContentPartPr/>
+              <p14:nvPr/>
+            </p14:nvContentPartPr>
+            <p14:xfrm>
+              <a:off x="7511269" y="2524811"/>
+              <a:ext cx="362520" cy="39240"/>
+            </p14:xfrm>
+          </p:contentPart>
+        </mc:Choice>
+        <mc:Fallback xmlns="">
+          <p:pic>
+            <p:nvPicPr>
+              <p:cNvPr id="19" name="Ink 18">
+                <a:extLst>
+                  <a:ext uri="{FF2B5EF4-FFF2-40B4-BE49-F238E27FC236}">
+                    <a16:creationId xmlns:a16="http://schemas.microsoft.com/office/drawing/2014/main" id="{93F3F115-68FB-AE4B-9786-3BDA56B767D4}"/>
+                  </a:ext>
+                </a:extLst>
+              </p:cNvPr>
+              <p:cNvPicPr/>
+              <p:nvPr/>
+            </p:nvPicPr>
+            <p:blipFill>
+              <a:blip r:embed="rId24"/>
+              <a:stretch>
+                <a:fillRect/>
+              </a:stretch>
+            </p:blipFill>
+            <p:spPr>
+              <a:xfrm>
+                <a:off x="7457269" y="2417171"/>
+                <a:ext cx="470160" cy="254880"/>
+              </a:xfrm>
+              <a:prstGeom prst="rect">
+                <a:avLst/>
+              </a:prstGeom>
+            </p:spPr>
+          </p:pic>
+        </mc:Fallback>
+      </mc:AlternateContent>
+      <mc:AlternateContent xmlns:mc="http://schemas.openxmlformats.org/markup-compatibility/2006" xmlns:p14="http://schemas.microsoft.com/office/powerpoint/2010/main">
+        <mc:Choice Requires="p14">
+          <p:contentPart p14:bwMode="auto" r:id="rId25">
+            <p14:nvContentPartPr>
+              <p14:cNvPr id="20" name="Ink 19">
+                <a:extLst>
+                  <a:ext uri="{FF2B5EF4-FFF2-40B4-BE49-F238E27FC236}">
+                    <a16:creationId xmlns:a16="http://schemas.microsoft.com/office/drawing/2014/main" id="{3D801CE6-F1A8-3149-BA28-C0E1FDD7DE6B}"/>
+                  </a:ext>
+                </a:extLst>
+              </p14:cNvPr>
+              <p14:cNvContentPartPr/>
+              <p14:nvPr/>
+            </p14:nvContentPartPr>
+            <p14:xfrm>
+              <a:off x="7502989" y="4399331"/>
+              <a:ext cx="413640" cy="70560"/>
+            </p14:xfrm>
+          </p:contentPart>
+        </mc:Choice>
+        <mc:Fallback xmlns="">
+          <p:pic>
+            <p:nvPicPr>
+              <p:cNvPr id="20" name="Ink 19">
+                <a:extLst>
+                  <a:ext uri="{FF2B5EF4-FFF2-40B4-BE49-F238E27FC236}">
+                    <a16:creationId xmlns:a16="http://schemas.microsoft.com/office/drawing/2014/main" id="{3D801CE6-F1A8-3149-BA28-C0E1FDD7DE6B}"/>
+                  </a:ext>
+                </a:extLst>
+              </p:cNvPr>
+              <p:cNvPicPr/>
+              <p:nvPr/>
+            </p:nvPicPr>
+            <p:blipFill>
+              <a:blip r:embed="rId26"/>
+              <a:stretch>
+                <a:fillRect/>
+              </a:stretch>
+            </p:blipFill>
+            <p:spPr>
+              <a:xfrm>
+                <a:off x="7449349" y="4291691"/>
+                <a:ext cx="521280" cy="286200"/>
+              </a:xfrm>
+              <a:prstGeom prst="rect">
+                <a:avLst/>
+              </a:prstGeom>
+            </p:spPr>
+          </p:pic>
+        </mc:Fallback>
+      </mc:AlternateContent>
+      <mc:AlternateContent xmlns:mc="http://schemas.openxmlformats.org/markup-compatibility/2006" xmlns:p14="http://schemas.microsoft.com/office/powerpoint/2010/main">
+        <mc:Choice Requires="p14">
+          <p:contentPart p14:bwMode="auto" r:id="rId27">
+            <p14:nvContentPartPr>
+              <p14:cNvPr id="22" name="Ink 21">
+                <a:extLst>
+                  <a:ext uri="{FF2B5EF4-FFF2-40B4-BE49-F238E27FC236}">
+                    <a16:creationId xmlns:a16="http://schemas.microsoft.com/office/drawing/2014/main" id="{A718A404-73BA-8D4D-8A26-E74699ACF89D}"/>
+                  </a:ext>
+                </a:extLst>
+              </p14:cNvPr>
+              <p14:cNvContentPartPr/>
+              <p14:nvPr/>
+            </p14:nvContentPartPr>
+            <p14:xfrm>
+              <a:off x="1278949" y="3440651"/>
+              <a:ext cx="316800" cy="43560"/>
+            </p14:xfrm>
+          </p:contentPart>
+        </mc:Choice>
+        <mc:Fallback xmlns="">
+          <p:pic>
+            <p:nvPicPr>
+              <p:cNvPr id="22" name="Ink 21">
+                <a:extLst>
+                  <a:ext uri="{FF2B5EF4-FFF2-40B4-BE49-F238E27FC236}">
+                    <a16:creationId xmlns:a16="http://schemas.microsoft.com/office/drawing/2014/main" id="{A718A404-73BA-8D4D-8A26-E74699ACF89D}"/>
+                  </a:ext>
+                </a:extLst>
+              </p:cNvPr>
+              <p:cNvPicPr/>
+              <p:nvPr/>
+            </p:nvPicPr>
+            <p:blipFill>
+              <a:blip r:embed="rId28"/>
+              <a:stretch>
+                <a:fillRect/>
+              </a:stretch>
+            </p:blipFill>
+            <p:spPr>
+              <a:xfrm>
+                <a:off x="1225309" y="3333011"/>
+                <a:ext cx="424440" cy="259200"/>
+              </a:xfrm>
+              <a:prstGeom prst="rect">
+                <a:avLst/>
+              </a:prstGeom>
+            </p:spPr>
+          </p:pic>
+        </mc:Fallback>
+      </mc:AlternateContent>
+      <mc:AlternateContent xmlns:mc="http://schemas.openxmlformats.org/markup-compatibility/2006" xmlns:p14="http://schemas.microsoft.com/office/powerpoint/2010/main">
+        <mc:Choice Requires="p14">
+          <p:contentPart p14:bwMode="auto" r:id="rId29">
+            <p14:nvContentPartPr>
+              <p14:cNvPr id="23" name="Ink 22">
+                <a:extLst>
+                  <a:ext uri="{FF2B5EF4-FFF2-40B4-BE49-F238E27FC236}">
+                    <a16:creationId xmlns:a16="http://schemas.microsoft.com/office/drawing/2014/main" id="{9FE1F69B-9A7A-C148-99A4-310A21E2B110}"/>
+                  </a:ext>
+                </a:extLst>
+              </p14:cNvPr>
+              <p14:cNvContentPartPr/>
+              <p14:nvPr/>
+            </p14:nvContentPartPr>
+            <p14:xfrm>
+              <a:off x="1299829" y="4941851"/>
+              <a:ext cx="294480" cy="39600"/>
+            </p14:xfrm>
+          </p:contentPart>
+        </mc:Choice>
+        <mc:Fallback xmlns="">
+          <p:pic>
+            <p:nvPicPr>
+              <p:cNvPr id="23" name="Ink 22">
+                <a:extLst>
+                  <a:ext uri="{FF2B5EF4-FFF2-40B4-BE49-F238E27FC236}">
+                    <a16:creationId xmlns:a16="http://schemas.microsoft.com/office/drawing/2014/main" id="{9FE1F69B-9A7A-C148-99A4-310A21E2B110}"/>
+                  </a:ext>
+                </a:extLst>
+              </p:cNvPr>
+              <p:cNvPicPr/>
+              <p:nvPr/>
+            </p:nvPicPr>
+            <p:blipFill>
+              <a:blip r:embed="rId30"/>
+              <a:stretch>
+                <a:fillRect/>
+              </a:stretch>
+            </p:blipFill>
+            <p:spPr>
+              <a:xfrm>
+                <a:off x="1245829" y="4834211"/>
+                <a:ext cx="402120" cy="255240"/>
+              </a:xfrm>
+              <a:prstGeom prst="rect">
+                <a:avLst/>
+              </a:prstGeom>
+            </p:spPr>
+          </p:pic>
+        </mc:Fallback>
+      </mc:AlternateContent>
+      <mc:AlternateContent xmlns:mc="http://schemas.openxmlformats.org/markup-compatibility/2006" xmlns:p14="http://schemas.microsoft.com/office/powerpoint/2010/main">
+        <mc:Choice Requires="p14">
+          <p:contentPart p14:bwMode="auto" r:id="rId31">
+            <p14:nvContentPartPr>
+              <p14:cNvPr id="24" name="Ink 23">
+                <a:extLst>
+                  <a:ext uri="{FF2B5EF4-FFF2-40B4-BE49-F238E27FC236}">
+                    <a16:creationId xmlns:a16="http://schemas.microsoft.com/office/drawing/2014/main" id="{ACF90805-1277-954E-AF14-B5C2A030DDFB}"/>
+                  </a:ext>
+                </a:extLst>
+              </p14:cNvPr>
+              <p14:cNvContentPartPr/>
+              <p14:nvPr/>
+            </p14:nvContentPartPr>
+            <p14:xfrm>
+              <a:off x="1302709" y="6382931"/>
+              <a:ext cx="231120" cy="16200"/>
+            </p14:xfrm>
+          </p:contentPart>
+        </mc:Choice>
+        <mc:Fallback xmlns="">
+          <p:pic>
+            <p:nvPicPr>
+              <p:cNvPr id="24" name="Ink 23">
+                <a:extLst>
+                  <a:ext uri="{FF2B5EF4-FFF2-40B4-BE49-F238E27FC236}">
+                    <a16:creationId xmlns:a16="http://schemas.microsoft.com/office/drawing/2014/main" id="{ACF90805-1277-954E-AF14-B5C2A030DDFB}"/>
+                  </a:ext>
+                </a:extLst>
+              </p:cNvPr>
+              <p:cNvPicPr/>
+              <p:nvPr/>
+            </p:nvPicPr>
+            <p:blipFill>
+              <a:blip r:embed="rId32"/>
+              <a:stretch>
+                <a:fillRect/>
+              </a:stretch>
+            </p:blipFill>
+            <p:spPr>
+              <a:xfrm>
+                <a:off x="1249069" y="6275291"/>
+                <a:ext cx="338760" cy="231840"/>
+              </a:xfrm>
+              <a:prstGeom prst="rect">
+                <a:avLst/>
+              </a:prstGeom>
+            </p:spPr>
+          </p:pic>
+        </mc:Fallback>
+      </mc:AlternateContent>
+      <mc:AlternateContent xmlns:mc="http://schemas.openxmlformats.org/markup-compatibility/2006" xmlns:p14="http://schemas.microsoft.com/office/powerpoint/2010/main">
+        <mc:Choice Requires="p14">
+          <p:contentPart p14:bwMode="auto" r:id="rId33">
+            <p14:nvContentPartPr>
+              <p14:cNvPr id="25" name="Ink 24">
+                <a:extLst>
+                  <a:ext uri="{FF2B5EF4-FFF2-40B4-BE49-F238E27FC236}">
+                    <a16:creationId xmlns:a16="http://schemas.microsoft.com/office/drawing/2014/main" id="{D36D01C0-0C75-FF4F-8BAF-EAD22C25D964}"/>
+                  </a:ext>
+                </a:extLst>
+              </p14:cNvPr>
+              <p14:cNvContentPartPr/>
+              <p14:nvPr/>
+            </p14:nvContentPartPr>
+            <p14:xfrm>
+              <a:off x="7487149" y="3483851"/>
+              <a:ext cx="290520" cy="7560"/>
+            </p14:xfrm>
+          </p:contentPart>
+        </mc:Choice>
+        <mc:Fallback xmlns="">
+          <p:pic>
+            <p:nvPicPr>
+              <p:cNvPr id="25" name="Ink 24">
+                <a:extLst>
+                  <a:ext uri="{FF2B5EF4-FFF2-40B4-BE49-F238E27FC236}">
+                    <a16:creationId xmlns:a16="http://schemas.microsoft.com/office/drawing/2014/main" id="{D36D01C0-0C75-FF4F-8BAF-EAD22C25D964}"/>
+                  </a:ext>
+                </a:extLst>
+              </p:cNvPr>
+              <p:cNvPicPr/>
+              <p:nvPr/>
+            </p:nvPicPr>
+            <p:blipFill>
+              <a:blip r:embed="rId34"/>
+              <a:stretch>
+                <a:fillRect/>
+              </a:stretch>
+            </p:blipFill>
+            <p:spPr>
+              <a:xfrm>
+                <a:off x="7433149" y="3376211"/>
+                <a:ext cx="398160" cy="223200"/>
+              </a:xfrm>
+              <a:prstGeom prst="rect">
+                <a:avLst/>
+              </a:prstGeom>
+            </p:spPr>
+          </p:pic>
+        </mc:Fallback>
+      </mc:AlternateContent>
+    </p:spTree>
+    <p:extLst>
+      <p:ext uri="{BB962C8B-B14F-4D97-AF65-F5344CB8AC3E}">
+        <p14:creationId xmlns:p14="http://schemas.microsoft.com/office/powerpoint/2010/main" val="2582876147"/>
+      </p:ext>
+    </p:extLst>
+  </p:cSld>
+  <p:clrMapOvr>
+    <a:masterClrMapping/>
+  </p:clrMapOvr>
+  <mc:AlternateContent xmlns:mc="http://schemas.openxmlformats.org/markup-compatibility/2006" xmlns:p14="http://schemas.microsoft.com/office/powerpoint/2010/main">
+    <mc:Choice Requires="p14">
+      <p:transition p14:dur="300">
+        <p:fade/>
+      </p:transition>
+    </mc:Choice>
+    <mc:Fallback xmlns="">
+      <p:transition>
+        <p:fade/>
+      </p:transition>
+    </mc:Fallback>
+  </mc:AlternateContent>
+  <p:timing>
+    <p:tnLst>
+      <p:par>
+        <p:cTn id="1" dur="indefinite" restart="never" nodeType="tmRoot">
+          <p:childTnLst>
+            <p:seq concurrent="1" nextAc="seek">
+              <p:cTn id="2" dur="indefinite" nodeType="mainSeq">
+                <p:childTnLst>
+                  <p:par>
+                    <p:cTn id="3" fill="hold">
+                      <p:stCondLst>
+                        <p:cond delay="indefinite"/>
+                      </p:stCondLst>
+                      <p:childTnLst>
+                        <p:par>
+                          <p:cTn id="4" fill="hold">
+                            <p:stCondLst>
+                              <p:cond delay="0"/>
+                            </p:stCondLst>
+                            <p:childTnLst>
+                              <p:par>
+                                <p:cTn id="5" presetID="22" presetClass="entr" presetSubtype="8" fill="hold" nodeType="clickEffect">
+                                  <p:stCondLst>
+                                    <p:cond delay="0"/>
+                                  </p:stCondLst>
+                                  <p:childTnLst>
+                                    <p:set>
+                                      <p:cBhvr>
+                                        <p:cTn id="6" dur="1" fill="hold">
+                                          <p:stCondLst>
+                                            <p:cond delay="0"/>
+                                          </p:stCondLst>
+                                        </p:cTn>
+                                        <p:tgtEl>
+                                          <p:spTgt spid="8"/>
+                                        </p:tgtEl>
+                                        <p:attrNameLst>
+                                          <p:attrName>style.visibility</p:attrName>
+                                        </p:attrNameLst>
+                                      </p:cBhvr>
+                                      <p:to>
+                                        <p:strVal val="visible"/>
+                                      </p:to>
+                                    </p:set>
+                                    <p:animEffect transition="in" filter="wipe(left)">
+                                      <p:cBhvr>
+                                        <p:cTn id="7" dur="500"/>
+                                        <p:tgtEl>
+                                          <p:spTgt spid="8"/>
+                                        </p:tgtEl>
+                                      </p:cBhvr>
+                                    </p:animEffect>
+                                  </p:childTnLst>
+                                </p:cTn>
+                              </p:par>
+                              <p:par>
+                                <p:cTn id="8" presetID="22" presetClass="entr" presetSubtype="8" fill="hold" nodeType="withEffect">
+                                  <p:stCondLst>
+                                    <p:cond delay="0"/>
+                                  </p:stCondLst>
+                                  <p:childTnLst>
+                                    <p:set>
+                                      <p:cBhvr>
+                                        <p:cTn id="9" dur="1" fill="hold">
+                                          <p:stCondLst>
+                                            <p:cond delay="0"/>
+                                          </p:stCondLst>
+                                        </p:cTn>
+                                        <p:tgtEl>
+                                          <p:spTgt spid="9"/>
+                                        </p:tgtEl>
+                                        <p:attrNameLst>
+                                          <p:attrName>style.visibility</p:attrName>
+                                        </p:attrNameLst>
+                                      </p:cBhvr>
+                                      <p:to>
+                                        <p:strVal val="visible"/>
+                                      </p:to>
+                                    </p:set>
+                                    <p:animEffect transition="in" filter="wipe(left)">
+                                      <p:cBhvr>
+                                        <p:cTn id="10" dur="500"/>
+                                        <p:tgtEl>
+                                          <p:spTgt spid="9"/>
+                                        </p:tgtEl>
+                                      </p:cBhvr>
+                                    </p:animEffect>
+                                  </p:childTnLst>
+                                </p:cTn>
+                              </p:par>
+                              <p:par>
+                                <p:cTn id="11" presetID="22" presetClass="entr" presetSubtype="8" fill="hold" nodeType="withEffect">
+                                  <p:stCondLst>
+                                    <p:cond delay="0"/>
+                                  </p:stCondLst>
+                                  <p:childTnLst>
+                                    <p:set>
+                                      <p:cBhvr>
+                                        <p:cTn id="12" dur="1" fill="hold">
+                                          <p:stCondLst>
+                                            <p:cond delay="0"/>
+                                          </p:stCondLst>
+                                        </p:cTn>
+                                        <p:tgtEl>
+                                          <p:spTgt spid="10"/>
+                                        </p:tgtEl>
+                                        <p:attrNameLst>
+                                          <p:attrName>style.visibility</p:attrName>
+                                        </p:attrNameLst>
+                                      </p:cBhvr>
+                                      <p:to>
+                                        <p:strVal val="visible"/>
+                                      </p:to>
+                                    </p:set>
+                                    <p:animEffect transition="in" filter="wipe(left)">
+                                      <p:cBhvr>
+                                        <p:cTn id="13" dur="500"/>
+                                        <p:tgtEl>
+                                          <p:spTgt spid="10"/>
+                                        </p:tgtEl>
+                                      </p:cBhvr>
+                                    </p:animEffect>
+                                  </p:childTnLst>
+                                </p:cTn>
+                              </p:par>
+                              <p:par>
+                                <p:cTn id="14" presetID="22" presetClass="entr" presetSubtype="8" fill="hold" nodeType="withEffect">
+                                  <p:stCondLst>
+                                    <p:cond delay="0"/>
+                                  </p:stCondLst>
+                                  <p:childTnLst>
+                                    <p:set>
+                                      <p:cBhvr>
+                                        <p:cTn id="15" dur="1" fill="hold">
+                                          <p:stCondLst>
+                                            <p:cond delay="0"/>
+                                          </p:stCondLst>
+                                        </p:cTn>
+                                        <p:tgtEl>
+                                          <p:spTgt spid="12"/>
+                                        </p:tgtEl>
+                                        <p:attrNameLst>
+                                          <p:attrName>style.visibility</p:attrName>
+                                        </p:attrNameLst>
+                                      </p:cBhvr>
+                                      <p:to>
+                                        <p:strVal val="visible"/>
+                                      </p:to>
+                                    </p:set>
+                                    <p:animEffect transition="in" filter="wipe(left)">
+                                      <p:cBhvr>
+                                        <p:cTn id="16" dur="500"/>
+                                        <p:tgtEl>
+                                          <p:spTgt spid="12"/>
+                                        </p:tgtEl>
+                                      </p:cBhvr>
+                                    </p:animEffect>
+                                  </p:childTnLst>
+                                </p:cTn>
+                              </p:par>
+                              <p:par>
+                                <p:cTn id="17" presetID="22" presetClass="entr" presetSubtype="8" fill="hold" nodeType="withEffect">
+                                  <p:stCondLst>
+                                    <p:cond delay="0"/>
+                                  </p:stCondLst>
+                                  <p:childTnLst>
+                                    <p:set>
+                                      <p:cBhvr>
+                                        <p:cTn id="18" dur="1" fill="hold">
+                                          <p:stCondLst>
+                                            <p:cond delay="0"/>
+                                          </p:stCondLst>
+                                        </p:cTn>
+                                        <p:tgtEl>
+                                          <p:spTgt spid="13"/>
+                                        </p:tgtEl>
+                                        <p:attrNameLst>
+                                          <p:attrName>style.visibility</p:attrName>
+                                        </p:attrNameLst>
+                                      </p:cBhvr>
+                                      <p:to>
+                                        <p:strVal val="visible"/>
+                                      </p:to>
+                                    </p:set>
+                                    <p:animEffect transition="in" filter="wipe(left)">
+                                      <p:cBhvr>
+                                        <p:cTn id="19" dur="500"/>
+                                        <p:tgtEl>
+                                          <p:spTgt spid="13"/>
+                                        </p:tgtEl>
+                                      </p:cBhvr>
+                                    </p:animEffect>
+                                  </p:childTnLst>
+                                </p:cTn>
+                              </p:par>
+                              <p:par>
+                                <p:cTn id="20" presetID="22" presetClass="entr" presetSubtype="8" fill="hold" nodeType="withEffect">
+                                  <p:stCondLst>
+                                    <p:cond delay="0"/>
+                                  </p:stCondLst>
+                                  <p:childTnLst>
+                                    <p:set>
+                                      <p:cBhvr>
+                                        <p:cTn id="21" dur="1" fill="hold">
+                                          <p:stCondLst>
+                                            <p:cond delay="0"/>
+                                          </p:stCondLst>
+                                        </p:cTn>
+                                        <p:tgtEl>
+                                          <p:spTgt spid="14"/>
+                                        </p:tgtEl>
+                                        <p:attrNameLst>
+                                          <p:attrName>style.visibility</p:attrName>
+                                        </p:attrNameLst>
+                                      </p:cBhvr>
+                                      <p:to>
+                                        <p:strVal val="visible"/>
+                                      </p:to>
+                                    </p:set>
+                                    <p:animEffect transition="in" filter="wipe(left)">
+                                      <p:cBhvr>
+                                        <p:cTn id="22" dur="500"/>
+                                        <p:tgtEl>
+                                          <p:spTgt spid="14"/>
+                                        </p:tgtEl>
+                                      </p:cBhvr>
+                                    </p:animEffect>
+                                  </p:childTnLst>
+                                </p:cTn>
+                              </p:par>
+                              <p:par>
+                                <p:cTn id="23" presetID="22" presetClass="entr" presetSubtype="8" fill="hold" nodeType="withEffect">
+                                  <p:stCondLst>
+                                    <p:cond delay="0"/>
+                                  </p:stCondLst>
+                                  <p:childTnLst>
+                                    <p:set>
+                                      <p:cBhvr>
+                                        <p:cTn id="24" dur="1" fill="hold">
+                                          <p:stCondLst>
+                                            <p:cond delay="0"/>
+                                          </p:stCondLst>
+                                        </p:cTn>
+                                        <p:tgtEl>
+                                          <p:spTgt spid="15"/>
+                                        </p:tgtEl>
+                                        <p:attrNameLst>
+                                          <p:attrName>style.visibility</p:attrName>
+                                        </p:attrNameLst>
+                                      </p:cBhvr>
+                                      <p:to>
+                                        <p:strVal val="visible"/>
+                                      </p:to>
+                                    </p:set>
+                                    <p:animEffect transition="in" filter="wipe(left)">
+                                      <p:cBhvr>
+                                        <p:cTn id="25" dur="500"/>
+                                        <p:tgtEl>
+                                          <p:spTgt spid="15"/>
+                                        </p:tgtEl>
+                                      </p:cBhvr>
+                                    </p:animEffect>
+                                  </p:childTnLst>
+                                </p:cTn>
+                              </p:par>
+                            </p:childTnLst>
+                          </p:cTn>
+                        </p:par>
+                      </p:childTnLst>
+                    </p:cTn>
+                  </p:par>
+                  <p:par>
+                    <p:cTn id="26" fill="hold">
+                      <p:stCondLst>
+                        <p:cond delay="indefinite"/>
+                      </p:stCondLst>
+                      <p:childTnLst>
+                        <p:par>
+                          <p:cTn id="27" fill="hold">
+                            <p:stCondLst>
+                              <p:cond delay="0"/>
+                            </p:stCondLst>
+                            <p:childTnLst>
+                              <p:par>
+                                <p:cTn id="28" presetID="22" presetClass="entr" presetSubtype="8" fill="hold" nodeType="clickEffect">
+                                  <p:stCondLst>
+                                    <p:cond delay="0"/>
+                                  </p:stCondLst>
+                                  <p:childTnLst>
+                                    <p:set>
+                                      <p:cBhvr>
+                                        <p:cTn id="29" dur="1" fill="hold">
+                                          <p:stCondLst>
+                                            <p:cond delay="0"/>
+                                          </p:stCondLst>
+                                        </p:cTn>
+                                        <p:tgtEl>
+                                          <p:spTgt spid="16"/>
+                                        </p:tgtEl>
+                                        <p:attrNameLst>
+                                          <p:attrName>style.visibility</p:attrName>
+                                        </p:attrNameLst>
+                                      </p:cBhvr>
+                                      <p:to>
+                                        <p:strVal val="visible"/>
+                                      </p:to>
+                                    </p:set>
+                                    <p:animEffect transition="in" filter="wipe(left)">
+                                      <p:cBhvr>
+                                        <p:cTn id="30" dur="500"/>
+                                        <p:tgtEl>
+                                          <p:spTgt spid="16"/>
+                                        </p:tgtEl>
+                                      </p:cBhvr>
+                                    </p:animEffect>
+                                  </p:childTnLst>
+                                </p:cTn>
+                              </p:par>
+                              <p:par>
+                                <p:cTn id="31" presetID="22" presetClass="entr" presetSubtype="8" fill="hold" nodeType="withEffect">
+                                  <p:stCondLst>
+                                    <p:cond delay="0"/>
+                                  </p:stCondLst>
+                                  <p:childTnLst>
+                                    <p:set>
+                                      <p:cBhvr>
+                                        <p:cTn id="32" dur="1" fill="hold">
+                                          <p:stCondLst>
+                                            <p:cond delay="0"/>
+                                          </p:stCondLst>
+                                        </p:cTn>
+                                        <p:tgtEl>
+                                          <p:spTgt spid="17"/>
+                                        </p:tgtEl>
+                                        <p:attrNameLst>
+                                          <p:attrName>style.visibility</p:attrName>
+                                        </p:attrNameLst>
+                                      </p:cBhvr>
+                                      <p:to>
+                                        <p:strVal val="visible"/>
+                                      </p:to>
+                                    </p:set>
+                                    <p:animEffect transition="in" filter="wipe(left)">
+                                      <p:cBhvr>
+                                        <p:cTn id="33" dur="500"/>
+                                        <p:tgtEl>
+                                          <p:spTgt spid="17"/>
+                                        </p:tgtEl>
+                                      </p:cBhvr>
+                                    </p:animEffect>
+                                  </p:childTnLst>
+                                </p:cTn>
+                              </p:par>
+                              <p:par>
+                                <p:cTn id="34" presetID="22" presetClass="entr" presetSubtype="8" fill="hold" nodeType="withEffect">
+                                  <p:stCondLst>
+                                    <p:cond delay="0"/>
+                                  </p:stCondLst>
+                                  <p:childTnLst>
+                                    <p:set>
+                                      <p:cBhvr>
+                                        <p:cTn id="35" dur="1" fill="hold">
+                                          <p:stCondLst>
+                                            <p:cond delay="0"/>
+                                          </p:stCondLst>
+                                        </p:cTn>
+                                        <p:tgtEl>
+                                          <p:spTgt spid="18"/>
+                                        </p:tgtEl>
+                                        <p:attrNameLst>
+                                          <p:attrName>style.visibility</p:attrName>
+                                        </p:attrNameLst>
+                                      </p:cBhvr>
+                                      <p:to>
+                                        <p:strVal val="visible"/>
+                                      </p:to>
+                                    </p:set>
+                                    <p:animEffect transition="in" filter="wipe(left)">
+                                      <p:cBhvr>
+                                        <p:cTn id="36" dur="500"/>
+                                        <p:tgtEl>
+                                          <p:spTgt spid="18"/>
+                                        </p:tgtEl>
+                                      </p:cBhvr>
+                                    </p:animEffect>
+                                  </p:childTnLst>
+                                </p:cTn>
+                              </p:par>
+                              <p:par>
+                                <p:cTn id="37" presetID="22" presetClass="entr" presetSubtype="8" fill="hold" nodeType="withEffect">
+                                  <p:stCondLst>
+                                    <p:cond delay="0"/>
+                                  </p:stCondLst>
+                                  <p:childTnLst>
+                                    <p:set>
+                                      <p:cBhvr>
+                                        <p:cTn id="38" dur="1" fill="hold">
+                                          <p:stCondLst>
+                                            <p:cond delay="0"/>
+                                          </p:stCondLst>
+                                        </p:cTn>
+                                        <p:tgtEl>
+                                          <p:spTgt spid="19"/>
+                                        </p:tgtEl>
+                                        <p:attrNameLst>
+                                          <p:attrName>style.visibility</p:attrName>
+                                        </p:attrNameLst>
+                                      </p:cBhvr>
+                                      <p:to>
+                                        <p:strVal val="visible"/>
+                                      </p:to>
+                                    </p:set>
+                                    <p:animEffect transition="in" filter="wipe(left)">
+                                      <p:cBhvr>
+                                        <p:cTn id="39" dur="500"/>
+                                        <p:tgtEl>
+                                          <p:spTgt spid="19"/>
+                                        </p:tgtEl>
+                                      </p:cBhvr>
+                                    </p:animEffect>
+                                  </p:childTnLst>
+                                </p:cTn>
+                              </p:par>
+                              <p:par>
+                                <p:cTn id="40" presetID="22" presetClass="entr" presetSubtype="8" fill="hold" nodeType="withEffect">
+                                  <p:stCondLst>
+                                    <p:cond delay="0"/>
+                                  </p:stCondLst>
+                                  <p:childTnLst>
+                                    <p:set>
+                                      <p:cBhvr>
+                                        <p:cTn id="41" dur="1" fill="hold">
+                                          <p:stCondLst>
+                                            <p:cond delay="0"/>
+                                          </p:stCondLst>
+                                        </p:cTn>
+                                        <p:tgtEl>
+                                          <p:spTgt spid="20"/>
+                                        </p:tgtEl>
+                                        <p:attrNameLst>
+                                          <p:attrName>style.visibility</p:attrName>
+                                        </p:attrNameLst>
+                                      </p:cBhvr>
+                                      <p:to>
+                                        <p:strVal val="visible"/>
+                                      </p:to>
+                                    </p:set>
+                                    <p:animEffect transition="in" filter="wipe(left)">
+                                      <p:cBhvr>
+                                        <p:cTn id="42" dur="500"/>
+                                        <p:tgtEl>
+                                          <p:spTgt spid="20"/>
+                                        </p:tgtEl>
+                                      </p:cBhvr>
+                                    </p:animEffect>
+                                  </p:childTnLst>
+                                </p:cTn>
+                              </p:par>
+                            </p:childTnLst>
+                          </p:cTn>
+                        </p:par>
+                      </p:childTnLst>
+                    </p:cTn>
+                  </p:par>
+                  <p:par>
+                    <p:cTn id="43" fill="hold">
+                      <p:stCondLst>
+                        <p:cond delay="indefinite"/>
+                      </p:stCondLst>
+                      <p:childTnLst>
+                        <p:par>
+                          <p:cTn id="44" fill="hold">
+                            <p:stCondLst>
+                              <p:cond delay="0"/>
+                            </p:stCondLst>
+                            <p:childTnLst>
+                              <p:par>
+                                <p:cTn id="45" presetID="22" presetClass="entr" presetSubtype="8" fill="hold" nodeType="clickEffect">
+                                  <p:stCondLst>
+                                    <p:cond delay="0"/>
+                                  </p:stCondLst>
+                                  <p:childTnLst>
+                                    <p:set>
+                                      <p:cBhvr>
+                                        <p:cTn id="46" dur="1" fill="hold">
+                                          <p:stCondLst>
+                                            <p:cond delay="0"/>
+                                          </p:stCondLst>
+                                        </p:cTn>
+                                        <p:tgtEl>
+                                          <p:spTgt spid="22"/>
+                                        </p:tgtEl>
+                                        <p:attrNameLst>
+                                          <p:attrName>style.visibility</p:attrName>
+                                        </p:attrNameLst>
+                                      </p:cBhvr>
+                                      <p:to>
+                                        <p:strVal val="visible"/>
+                                      </p:to>
+                                    </p:set>
+                                    <p:animEffect transition="in" filter="wipe(left)">
+                                      <p:cBhvr>
+                                        <p:cTn id="47" dur="500"/>
+                                        <p:tgtEl>
+                                          <p:spTgt spid="22"/>
+                                        </p:tgtEl>
+                                      </p:cBhvr>
+                                    </p:animEffect>
+                                  </p:childTnLst>
+                                </p:cTn>
+                              </p:par>
+                              <p:par>
+                                <p:cTn id="48" presetID="22" presetClass="entr" presetSubtype="8" fill="hold" nodeType="withEffect">
+                                  <p:stCondLst>
+                                    <p:cond delay="0"/>
+                                  </p:stCondLst>
+                                  <p:childTnLst>
+                                    <p:set>
+                                      <p:cBhvr>
+                                        <p:cTn id="49" dur="1" fill="hold">
+                                          <p:stCondLst>
+                                            <p:cond delay="0"/>
+                                          </p:stCondLst>
+                                        </p:cTn>
+                                        <p:tgtEl>
+                                          <p:spTgt spid="23"/>
+                                        </p:tgtEl>
+                                        <p:attrNameLst>
+                                          <p:attrName>style.visibility</p:attrName>
+                                        </p:attrNameLst>
+                                      </p:cBhvr>
+                                      <p:to>
+                                        <p:strVal val="visible"/>
+                                      </p:to>
+                                    </p:set>
+                                    <p:animEffect transition="in" filter="wipe(left)">
+                                      <p:cBhvr>
+                                        <p:cTn id="50" dur="500"/>
+                                        <p:tgtEl>
+                                          <p:spTgt spid="23"/>
+                                        </p:tgtEl>
+                                      </p:cBhvr>
+                                    </p:animEffect>
+                                  </p:childTnLst>
+                                </p:cTn>
+                              </p:par>
+                              <p:par>
+                                <p:cTn id="51" presetID="22" presetClass="entr" presetSubtype="8" fill="hold" nodeType="withEffect">
+                                  <p:stCondLst>
+                                    <p:cond delay="0"/>
+                                  </p:stCondLst>
+                                  <p:childTnLst>
+                                    <p:set>
+                                      <p:cBhvr>
+                                        <p:cTn id="52" dur="1" fill="hold">
+                                          <p:stCondLst>
+                                            <p:cond delay="0"/>
+                                          </p:stCondLst>
+                                        </p:cTn>
+                                        <p:tgtEl>
+                                          <p:spTgt spid="24"/>
+                                        </p:tgtEl>
+                                        <p:attrNameLst>
+                                          <p:attrName>style.visibility</p:attrName>
+                                        </p:attrNameLst>
+                                      </p:cBhvr>
+                                      <p:to>
+                                        <p:strVal val="visible"/>
+                                      </p:to>
+                                    </p:set>
+                                    <p:animEffect transition="in" filter="wipe(left)">
+                                      <p:cBhvr>
+                                        <p:cTn id="53" dur="500"/>
+                                        <p:tgtEl>
+                                          <p:spTgt spid="24"/>
+                                        </p:tgtEl>
+                                      </p:cBhvr>
+                                    </p:animEffect>
+                                  </p:childTnLst>
+                                </p:cTn>
+                              </p:par>
+                              <p:par>
+                                <p:cTn id="54" presetID="22" presetClass="entr" presetSubtype="8" fill="hold" nodeType="withEffect">
+                                  <p:stCondLst>
+                                    <p:cond delay="0"/>
+                                  </p:stCondLst>
+                                  <p:childTnLst>
+                                    <p:set>
+                                      <p:cBhvr>
+                                        <p:cTn id="55" dur="1" fill="hold">
+                                          <p:stCondLst>
+                                            <p:cond delay="0"/>
+                                          </p:stCondLst>
+                                        </p:cTn>
+                                        <p:tgtEl>
+                                          <p:spTgt spid="25"/>
+                                        </p:tgtEl>
+                                        <p:attrNameLst>
+                                          <p:attrName>style.visibility</p:attrName>
+                                        </p:attrNameLst>
+                                      </p:cBhvr>
+                                      <p:to>
+                                        <p:strVal val="visible"/>
+                                      </p:to>
+                                    </p:set>
+                                    <p:animEffect transition="in" filter="wipe(left)">
+                                      <p:cBhvr>
+                                        <p:cTn id="56" dur="500"/>
+                                        <p:tgtEl>
+                                          <p:spTgt spid="25"/>
+                                        </p:tgtEl>
+                                      </p:cBhvr>
+                                    </p:animEffect>
+                                  </p:childTnLst>
+                                </p:cTn>
+                              </p:par>
+                            </p:childTnLst>
+                          </p:cTn>
+                        </p:par>
+                      </p:childTnLst>
+                    </p:cTn>
+                  </p:par>
+                </p:childTnLst>
+              </p:cTn>
+              <p:prevCondLst>
+                <p:cond evt="onPrev" delay="0">
+                  <p:tgtEl>
+                    <p:sldTgt/>
+                  </p:tgtEl>
+                </p:cond>
+              </p:prevCondLst>
+              <p:nextCondLst>
+                <p:cond evt="onNext" delay="0">
+                  <p:tgtEl>
+                    <p:sldTgt/>
+                  </p:tgtEl>
+                </p:cond>
+              </p:nextCondLst>
+            </p:seq>
+          </p:childTnLst>
+        </p:cTn>
+      </p:par>
+    </p:tnLst>
+  </p:timing>
+</p:sld>
+</file>
+
+<file path=ppt/slides/slide5.xml><?xml version="1.0" encoding="utf-8"?>
+<p:sld xmlns:a="http://schemas.openxmlformats.org/drawingml/2006/main" xmlns:r="http://schemas.openxmlformats.org/officeDocument/2006/relationships" xmlns:p="http://schemas.openxmlformats.org/presentationml/2006/main">
+  <p:cSld>
+    <p:spTree>
+      <p:nvGrpSpPr>
+        <p:cNvPr id="1" name=""/>
+        <p:cNvGrpSpPr/>
+        <p:nvPr/>
+      </p:nvGrpSpPr>
+      <p:grpSpPr>
+        <a:xfrm>
+          <a:off x="0" y="0"/>
+          <a:ext cx="0" cy="0"/>
+          <a:chOff x="0" y="0"/>
+          <a:chExt cx="0" cy="0"/>
+        </a:xfrm>
+      </p:grpSpPr>
+      <p:sp>
+        <p:nvSpPr>
+          <p:cNvPr id="2" name="Title 1">
+            <a:extLst>
+              <a:ext uri="{FF2B5EF4-FFF2-40B4-BE49-F238E27FC236}">
+                <a16:creationId xmlns:a16="http://schemas.microsoft.com/office/drawing/2014/main" id="{B90AED28-87E6-634B-BFE8-DF275995E7FE}"/>
+              </a:ext>
+            </a:extLst>
+          </p:cNvPr>
+          <p:cNvSpPr>
+            <a:spLocks noGrp="1"/>
+          </p:cNvSpPr>
+          <p:nvPr>
+            <p:ph type="title"/>
+          </p:nvPr>
+        </p:nvSpPr>
+        <p:spPr/>
+        <p:txBody>
+          <a:bodyPr/>
+          <a:lstStyle/>
+          <a:p>
+            <a:r>
+              <a:rPr lang="en-US" dirty="0"/>
+              <a:t>Knowledge Check: Discussion</a:t>
+            </a:r>
+          </a:p>
+        </p:txBody>
+      </p:sp>
+      <p:pic>
+        <p:nvPicPr>
+          <p:cNvPr id="4" name="Picture 3">
+            <a:extLst>
+              <a:ext uri="{FF2B5EF4-FFF2-40B4-BE49-F238E27FC236}">
+                <a16:creationId xmlns:a16="http://schemas.microsoft.com/office/drawing/2014/main" id="{4EC13374-AC6A-5644-9045-EE7FB5A33C60}"/>
+              </a:ext>
+            </a:extLst>
+          </p:cNvPr>
+          <p:cNvPicPr>
+            <a:picLocks noChangeAspect="1"/>
+          </p:cNvPicPr>
+          <p:nvPr/>
+        </p:nvPicPr>
+        <p:blipFill>
+          <a:blip r:embed="rId3"/>
+          <a:stretch>
+            <a:fillRect/>
+          </a:stretch>
+        </p:blipFill>
+        <p:spPr>
+          <a:xfrm>
+            <a:off x="1263505" y="2172776"/>
+            <a:ext cx="11783828" cy="3426847"/>
+          </a:xfrm>
+          <a:prstGeom prst="rect">
+            <a:avLst/>
+          </a:prstGeom>
+        </p:spPr>
+      </p:pic>
+      <p:sp>
+        <p:nvSpPr>
+          <p:cNvPr id="5" name="TextBox 4">
+            <a:extLst>
+              <a:ext uri="{FF2B5EF4-FFF2-40B4-BE49-F238E27FC236}">
+                <a16:creationId xmlns:a16="http://schemas.microsoft.com/office/drawing/2014/main" id="{E7144EB2-284D-9E47-9C14-E539D56ADDA6}"/>
+              </a:ext>
+            </a:extLst>
+          </p:cNvPr>
+          <p:cNvSpPr txBox="1"/>
+          <p:nvPr/>
+        </p:nvSpPr>
+        <p:spPr>
+          <a:xfrm>
+            <a:off x="4686076" y="6308677"/>
+            <a:ext cx="4445448" cy="400110"/>
+          </a:xfrm>
+          <a:prstGeom prst="rect">
+            <a:avLst/>
+          </a:prstGeom>
+          <a:noFill/>
+        </p:spPr>
+        <p:txBody>
+          <a:bodyPr wrap="none" rtlCol="0">
+            <a:spAutoFit/>
+          </a:bodyPr>
+          <a:lstStyle/>
+          <a:p>
+            <a:r>
+              <a:rPr lang="en-US" dirty="0"/>
+              <a:t>Discussion – Why would this be true?</a:t>
+            </a:r>
+          </a:p>
+        </p:txBody>
+      </p:sp>
+    </p:spTree>
+    <p:extLst>
+      <p:ext uri="{BB962C8B-B14F-4D97-AF65-F5344CB8AC3E}">
+        <p14:creationId xmlns:p14="http://schemas.microsoft.com/office/powerpoint/2010/main" val="3821025075"/>
+      </p:ext>
+    </p:extLst>
+  </p:cSld>
+  <p:clrMapOvr>
+    <a:masterClrMapping/>
+  </p:clrMapOvr>
+  <mc:AlternateContent xmlns:mc="http://schemas.openxmlformats.org/markup-compatibility/2006" xmlns:p14="http://schemas.microsoft.com/office/powerpoint/2010/main">
+    <mc:Choice Requires="p14">
+      <p:transition p14:dur="300">
+        <p:fade/>
+      </p:transition>
+    </mc:Choice>
+    <mc:Fallback xmlns="">
+      <p:transition>
+        <p:fade/>
+      </p:transition>
+    </mc:Fallback>
+  </mc:AlternateContent>
+</p:sld>
+</file>
+
+<file path=ppt/slides/slide6.xml><?xml version="1.0" encoding="utf-8"?>
 <p:sld xmlns:a="http://schemas.openxmlformats.org/drawingml/2006/main" xmlns:r="http://schemas.openxmlformats.org/officeDocument/2006/relationships" xmlns:p="http://schemas.openxmlformats.org/presentationml/2006/main">
   <p:cSld>
     <p:spTree>
@@ -7232,7 +10193,7 @@
 </p:sld>
 </file>
 
-<file path=ppt/slides/slide4.xml><?xml version="1.0" encoding="utf-8"?>
+<file path=ppt/slides/slide7.xml><?xml version="1.0" encoding="utf-8"?>
 <p:sld xmlns:a="http://schemas.openxmlformats.org/drawingml/2006/main" xmlns:r="http://schemas.openxmlformats.org/officeDocument/2006/relationships" xmlns:p="http://schemas.openxmlformats.org/presentationml/2006/main">
   <p:cSld>
     <p:spTree>
@@ -7468,7 +10429,107 @@
 </p:sld>
 </file>
 
-<file path=ppt/slides/slide5.xml><?xml version="1.0" encoding="utf-8"?>
+<file path=ppt/slides/slide8.xml><?xml version="1.0" encoding="utf-8"?>
+<p:sld xmlns:a="http://schemas.openxmlformats.org/drawingml/2006/main" xmlns:r="http://schemas.openxmlformats.org/officeDocument/2006/relationships" xmlns:p="http://schemas.openxmlformats.org/presentationml/2006/main">
+  <p:cSld>
+    <p:spTree>
+      <p:nvGrpSpPr>
+        <p:cNvPr id="1" name=""/>
+        <p:cNvGrpSpPr/>
+        <p:nvPr/>
+      </p:nvGrpSpPr>
+      <p:grpSpPr>
+        <a:xfrm>
+          <a:off x="0" y="0"/>
+          <a:ext cx="0" cy="0"/>
+          <a:chOff x="0" y="0"/>
+          <a:chExt cx="0" cy="0"/>
+        </a:xfrm>
+      </p:grpSpPr>
+      <p:sp>
+        <p:nvSpPr>
+          <p:cNvPr id="2" name="Title 1">
+            <a:extLst>
+              <a:ext uri="{FF2B5EF4-FFF2-40B4-BE49-F238E27FC236}">
+                <a16:creationId xmlns:a16="http://schemas.microsoft.com/office/drawing/2014/main" id="{38BF2065-1B28-A843-AEF6-D901C4C8CD76}"/>
+              </a:ext>
+            </a:extLst>
+          </p:cNvPr>
+          <p:cNvSpPr>
+            <a:spLocks noGrp="1"/>
+          </p:cNvSpPr>
+          <p:nvPr>
+            <p:ph type="title"/>
+          </p:nvPr>
+        </p:nvSpPr>
+        <p:spPr/>
+        <p:txBody>
+          <a:bodyPr/>
+          <a:lstStyle/>
+          <a:p>
+            <a:r>
+              <a:rPr lang="en-US" dirty="0"/>
+              <a:t>Knowledge Check: Discuss</a:t>
+            </a:r>
+          </a:p>
+        </p:txBody>
+      </p:sp>
+      <p:pic>
+        <p:nvPicPr>
+          <p:cNvPr id="4" name="Picture 3">
+            <a:extLst>
+              <a:ext uri="{FF2B5EF4-FFF2-40B4-BE49-F238E27FC236}">
+                <a16:creationId xmlns:a16="http://schemas.microsoft.com/office/drawing/2014/main" id="{D5825B21-CC66-E14A-AA16-B1D77D5138A0}"/>
+              </a:ext>
+            </a:extLst>
+          </p:cNvPr>
+          <p:cNvPicPr>
+            <a:picLocks noChangeAspect="1"/>
+          </p:cNvPicPr>
+          <p:nvPr/>
+        </p:nvPicPr>
+        <p:blipFill>
+          <a:blip r:embed="rId3"/>
+          <a:stretch>
+            <a:fillRect/>
+          </a:stretch>
+        </p:blipFill>
+        <p:spPr>
+          <a:xfrm>
+            <a:off x="2233316" y="1287131"/>
+            <a:ext cx="9350967" cy="6037210"/>
+          </a:xfrm>
+          <a:prstGeom prst="rect">
+            <a:avLst/>
+          </a:prstGeom>
+        </p:spPr>
+      </p:pic>
+    </p:spTree>
+    <p:extLst>
+      <p:ext uri="{BB962C8B-B14F-4D97-AF65-F5344CB8AC3E}">
+        <p14:creationId xmlns:p14="http://schemas.microsoft.com/office/powerpoint/2010/main" val="344737475"/>
+      </p:ext>
+    </p:extLst>
+  </p:cSld>
+  <p:clrMapOvr>
+    <a:masterClrMapping/>
+  </p:clrMapOvr>
+  <mc:AlternateContent xmlns:mc="http://schemas.openxmlformats.org/markup-compatibility/2006" xmlns:p14="http://schemas.microsoft.com/office/powerpoint/2010/main">
+    <mc:Choice Requires="p14">
+      <p:transition p14:dur="300">
+        <p:fade/>
+      </p:transition>
+    </mc:Choice>
+    <mc:Fallback xmlns="">
+      <p:transition>
+        <p:fade/>
+      </p:transition>
+    </mc:Fallback>
+  </mc:AlternateContent>
+</p:sld>
+</file>
+
+<file path=ppt/slides/slide9.xml><?xml version="1.0" encoding="utf-8"?>
 <p:sld xmlns:a="http://schemas.openxmlformats.org/drawingml/2006/main" xmlns:r="http://schemas.openxmlformats.org/officeDocument/2006/relationships" xmlns:p="http://schemas.openxmlformats.org/presentationml/2006/main">
   <p:cSld>
     <p:spTree>
@@ -7532,7 +10593,7 @@
         <p:spPr>
           <a:xfrm>
             <a:off x="628075" y="1424500"/>
-            <a:ext cx="12561453" cy="5405775"/>
+            <a:ext cx="12561453" cy="5892062"/>
           </a:xfrm>
         </p:spPr>
         <p:txBody>
@@ -7619,15 +10680,15 @@
           <a:p>
             <a:pPr lvl="1"/>
             <a:r>
-              <a:rPr lang="en-US" dirty="0"/>
+              <a:rPr lang="en-US" u="sng" dirty="0"/>
               <a:t>TEST every method, </a:t>
             </a:r>
             <a:r>
-              <a:rPr lang="en-US" b="1" dirty="0"/>
+              <a:rPr lang="en-US" b="1" u="sng" dirty="0"/>
               <a:t>before</a:t>
             </a:r>
             <a:r>
-              <a:rPr lang="en-US" dirty="0"/>
+              <a:rPr lang="en-US" u="sng" dirty="0"/>
               <a:t> coding other methods!</a:t>
             </a:r>
           </a:p>
@@ -7635,6 +10696,21 @@
             <a:r>
               <a:rPr lang="en-US" dirty="0"/>
               <a:t>Let’s look at code</a:t>
+            </a:r>
+          </a:p>
+          <a:p>
+            <a:pPr lvl="1"/>
+            <a:r>
+              <a:rPr lang="en-US" dirty="0"/>
+              <a:t>Tests done in this class are available in </a:t>
+            </a:r>
+            <a:r>
+              <a:rPr lang="en-US" dirty="0" err="1"/>
+              <a:t>zybooks</a:t>
+            </a:r>
+            <a:r>
+              <a:rPr lang="en-US" dirty="0"/>
+              <a:t>. </a:t>
             </a:r>
           </a:p>
         </p:txBody>

</xml_diff>